<commit_message>
Amelioration MOCKUP et ZONING
</commit_message>
<xml_diff>
--- a/Annexes/MockupEnchere.pptx
+++ b/Annexes/MockupEnchere.pptx
@@ -6,6 +6,9 @@
   </p:sldMasterIdLst>
   <p:sldIdLst>
     <p:sldId id="256" r:id="rId2"/>
+    <p:sldId id="257" r:id="rId3"/>
+    <p:sldId id="258" r:id="rId4"/>
+    <p:sldId id="259" r:id="rId5"/>
   </p:sldIdLst>
   <p:sldSz cx="12192000" cy="6858000"/>
   <p:notesSz cx="6858000" cy="9144000"/>
@@ -104,6 +107,35 @@
       </a:defRPr>
     </a:lvl9pPr>
   </p:defaultTextStyle>
+  <p:extLst>
+    <p:ext uri="{521415D9-36F7-43E2-AB2F-B90AF26B5E84}">
+      <p14:sectionLst xmlns:p14="http://schemas.microsoft.com/office/powerpoint/2010/main">
+        <p14:section name="ZONING PAGE ACCEUIL" id="{132A2229-9DDB-4788-84E5-837EBD580C87}">
+          <p14:sldIdLst>
+            <p14:sldId id="256"/>
+          </p14:sldIdLst>
+        </p14:section>
+        <p14:section name="MOCKUP PAGE D'ACCEUIL" id="{949C9211-0CF0-48F9-AF5A-1E08DD453D61}">
+          <p14:sldIdLst>
+            <p14:sldId id="257"/>
+          </p14:sldIdLst>
+        </p14:section>
+        <p14:section name="ZONING PAGE DE LOT" id="{6336E78D-BDC6-4819-B10B-E1BFD2F188C3}">
+          <p14:sldIdLst>
+            <p14:sldId id="258"/>
+          </p14:sldIdLst>
+        </p14:section>
+        <p14:section name="MOCKUP PAGE DE LOT" id="{B2416369-922E-4927-B61E-CF79C16AB041}">
+          <p14:sldIdLst>
+            <p14:sldId id="259"/>
+          </p14:sldIdLst>
+        </p14:section>
+      </p14:sectionLst>
+    </p:ext>
+    <p:ext uri="{EFAFB233-063F-42B5-8137-9DF3F51BA10A}">
+      <p15:sldGuideLst xmlns:p15="http://schemas.microsoft.com/office/powerpoint/2012/main"/>
+    </p:ext>
+  </p:extLst>
 </p:presentation>
 </file>
 
@@ -256,7 +288,7 @@
           <a:p>
             <a:fld id="{E5321D17-A8A2-4BD7-9C7D-8DAECA7660B1}" type="datetimeFigureOut">
               <a:rPr lang="fr-CH" smtClean="0"/>
-              <a:t>12.05.2024</a:t>
+              <a:t>17.05.2024</a:t>
             </a:fld>
             <a:endParaRPr lang="fr-CH"/>
           </a:p>
@@ -456,7 +488,7 @@
           <a:p>
             <a:fld id="{E5321D17-A8A2-4BD7-9C7D-8DAECA7660B1}" type="datetimeFigureOut">
               <a:rPr lang="fr-CH" smtClean="0"/>
-              <a:t>12.05.2024</a:t>
+              <a:t>17.05.2024</a:t>
             </a:fld>
             <a:endParaRPr lang="fr-CH"/>
           </a:p>
@@ -666,7 +698,7 @@
           <a:p>
             <a:fld id="{E5321D17-A8A2-4BD7-9C7D-8DAECA7660B1}" type="datetimeFigureOut">
               <a:rPr lang="fr-CH" smtClean="0"/>
-              <a:t>12.05.2024</a:t>
+              <a:t>17.05.2024</a:t>
             </a:fld>
             <a:endParaRPr lang="fr-CH"/>
           </a:p>
@@ -866,7 +898,7 @@
           <a:p>
             <a:fld id="{E5321D17-A8A2-4BD7-9C7D-8DAECA7660B1}" type="datetimeFigureOut">
               <a:rPr lang="fr-CH" smtClean="0"/>
-              <a:t>12.05.2024</a:t>
+              <a:t>17.05.2024</a:t>
             </a:fld>
             <a:endParaRPr lang="fr-CH"/>
           </a:p>
@@ -1142,7 +1174,7 @@
           <a:p>
             <a:fld id="{E5321D17-A8A2-4BD7-9C7D-8DAECA7660B1}" type="datetimeFigureOut">
               <a:rPr lang="fr-CH" smtClean="0"/>
-              <a:t>12.05.2024</a:t>
+              <a:t>17.05.2024</a:t>
             </a:fld>
             <a:endParaRPr lang="fr-CH"/>
           </a:p>
@@ -1410,7 +1442,7 @@
           <a:p>
             <a:fld id="{E5321D17-A8A2-4BD7-9C7D-8DAECA7660B1}" type="datetimeFigureOut">
               <a:rPr lang="fr-CH" smtClean="0"/>
-              <a:t>12.05.2024</a:t>
+              <a:t>17.05.2024</a:t>
             </a:fld>
             <a:endParaRPr lang="fr-CH"/>
           </a:p>
@@ -1825,7 +1857,7 @@
           <a:p>
             <a:fld id="{E5321D17-A8A2-4BD7-9C7D-8DAECA7660B1}" type="datetimeFigureOut">
               <a:rPr lang="fr-CH" smtClean="0"/>
-              <a:t>12.05.2024</a:t>
+              <a:t>17.05.2024</a:t>
             </a:fld>
             <a:endParaRPr lang="fr-CH"/>
           </a:p>
@@ -1967,7 +1999,7 @@
           <a:p>
             <a:fld id="{E5321D17-A8A2-4BD7-9C7D-8DAECA7660B1}" type="datetimeFigureOut">
               <a:rPr lang="fr-CH" smtClean="0"/>
-              <a:t>12.05.2024</a:t>
+              <a:t>17.05.2024</a:t>
             </a:fld>
             <a:endParaRPr lang="fr-CH"/>
           </a:p>
@@ -2080,7 +2112,7 @@
           <a:p>
             <a:fld id="{E5321D17-A8A2-4BD7-9C7D-8DAECA7660B1}" type="datetimeFigureOut">
               <a:rPr lang="fr-CH" smtClean="0"/>
-              <a:t>12.05.2024</a:t>
+              <a:t>17.05.2024</a:t>
             </a:fld>
             <a:endParaRPr lang="fr-CH"/>
           </a:p>
@@ -2393,7 +2425,7 @@
           <a:p>
             <a:fld id="{E5321D17-A8A2-4BD7-9C7D-8DAECA7660B1}" type="datetimeFigureOut">
               <a:rPr lang="fr-CH" smtClean="0"/>
-              <a:t>12.05.2024</a:t>
+              <a:t>17.05.2024</a:t>
             </a:fld>
             <a:endParaRPr lang="fr-CH"/>
           </a:p>
@@ -2682,7 +2714,7 @@
           <a:p>
             <a:fld id="{E5321D17-A8A2-4BD7-9C7D-8DAECA7660B1}" type="datetimeFigureOut">
               <a:rPr lang="fr-CH" smtClean="0"/>
-              <a:t>12.05.2024</a:t>
+              <a:t>17.05.2024</a:t>
             </a:fld>
             <a:endParaRPr lang="fr-CH"/>
           </a:p>
@@ -2925,7 +2957,7 @@
           <a:p>
             <a:fld id="{E5321D17-A8A2-4BD7-9C7D-8DAECA7660B1}" type="datetimeFigureOut">
               <a:rPr lang="fr-CH" smtClean="0"/>
-              <a:t>12.05.2024</a:t>
+              <a:t>17.05.2024</a:t>
             </a:fld>
             <a:endParaRPr lang="fr-CH"/>
           </a:p>
@@ -3423,219 +3455,11 @@
           <a:lstStyle/>
           <a:p>
             <a:pPr algn="ctr"/>
-            <a:endParaRPr lang="fr-CH"/>
-          </a:p>
-        </p:txBody>
-      </p:sp>
-      <p:sp>
-        <p:nvSpPr>
-          <p:cNvPr id="5" name="ZoneTexte 4">
-            <a:extLst>
-              <a:ext uri="{FF2B5EF4-FFF2-40B4-BE49-F238E27FC236}">
-                <a16:creationId xmlns:a16="http://schemas.microsoft.com/office/drawing/2014/main" id="{E0C67E48-1472-4217-D731-01EBA48072D0}"/>
-              </a:ext>
-            </a:extLst>
-          </p:cNvPr>
-          <p:cNvSpPr txBox="1"/>
-          <p:nvPr/>
-        </p:nvSpPr>
-        <p:spPr>
-          <a:xfrm>
-            <a:off x="9268287" y="160079"/>
-            <a:ext cx="692460" cy="276999"/>
-          </a:xfrm>
-          <a:prstGeom prst="rect">
-            <a:avLst/>
-          </a:prstGeom>
-          <a:noFill/>
-        </p:spPr>
-        <p:txBody>
-          <a:bodyPr wrap="square" rtlCol="0">
-            <a:spAutoFit/>
-          </a:bodyPr>
-          <a:lstStyle/>
-          <a:p>
-            <a:r>
-              <a:rPr lang="fr-CH" sz="1200" dirty="0" err="1">
-                <a:solidFill>
-                  <a:schemeClr val="bg1"/>
-                </a:solidFill>
-              </a:rPr>
-              <a:t>Acceuil</a:t>
-            </a:r>
-            <a:endParaRPr lang="fr-CH" sz="1200" dirty="0">
-              <a:solidFill>
-                <a:schemeClr val="bg1"/>
-              </a:solidFill>
-            </a:endParaRPr>
-          </a:p>
-        </p:txBody>
-      </p:sp>
-      <p:sp>
-        <p:nvSpPr>
-          <p:cNvPr id="6" name="ZoneTexte 5">
-            <a:extLst>
-              <a:ext uri="{FF2B5EF4-FFF2-40B4-BE49-F238E27FC236}">
-                <a16:creationId xmlns:a16="http://schemas.microsoft.com/office/drawing/2014/main" id="{2B763FD1-30E8-5A07-4543-5FC116E6020E}"/>
-              </a:ext>
-            </a:extLst>
-          </p:cNvPr>
-          <p:cNvSpPr txBox="1"/>
-          <p:nvPr/>
-        </p:nvSpPr>
-        <p:spPr>
-          <a:xfrm>
-            <a:off x="10062093" y="160360"/>
-            <a:ext cx="587404" cy="276999"/>
-          </a:xfrm>
-          <a:prstGeom prst="rect">
-            <a:avLst/>
-          </a:prstGeom>
-          <a:noFill/>
-        </p:spPr>
-        <p:txBody>
-          <a:bodyPr wrap="square" rtlCol="0">
-            <a:spAutoFit/>
-          </a:bodyPr>
-          <a:lstStyle/>
-          <a:p>
-            <a:r>
-              <a:rPr lang="fr-CH" sz="1200" dirty="0">
-                <a:solidFill>
-                  <a:schemeClr val="bg1"/>
-                </a:solidFill>
-              </a:rPr>
-              <a:t>Lots</a:t>
-            </a:r>
-          </a:p>
-        </p:txBody>
-      </p:sp>
-      <p:sp>
-        <p:nvSpPr>
-          <p:cNvPr id="7" name="ZoneTexte 6">
-            <a:extLst>
-              <a:ext uri="{FF2B5EF4-FFF2-40B4-BE49-F238E27FC236}">
-                <a16:creationId xmlns:a16="http://schemas.microsoft.com/office/drawing/2014/main" id="{E7E4D48E-87FF-2171-E37D-C9E77ECA0386}"/>
-              </a:ext>
-            </a:extLst>
-          </p:cNvPr>
-          <p:cNvSpPr txBox="1"/>
-          <p:nvPr/>
-        </p:nvSpPr>
-        <p:spPr>
-          <a:xfrm>
-            <a:off x="10621012" y="160079"/>
-            <a:ext cx="797515" cy="276999"/>
-          </a:xfrm>
-          <a:prstGeom prst="rect">
-            <a:avLst/>
-          </a:prstGeom>
-          <a:noFill/>
-        </p:spPr>
-        <p:txBody>
-          <a:bodyPr wrap="square" rtlCol="0">
-            <a:spAutoFit/>
-          </a:bodyPr>
-          <a:lstStyle/>
-          <a:p>
-            <a:r>
-              <a:rPr lang="fr-CH" sz="1200" dirty="0">
-                <a:solidFill>
-                  <a:schemeClr val="bg1"/>
-                </a:solidFill>
-              </a:rPr>
-              <a:t>A</a:t>
-            </a:r>
-            <a:r>
-              <a:rPr lang="fr-CH" sz="1200" dirty="0"/>
-              <a:t> </a:t>
-            </a:r>
-            <a:r>
-              <a:rPr lang="fr-CH" sz="1200" dirty="0">
-                <a:solidFill>
-                  <a:schemeClr val="bg1"/>
-                </a:solidFill>
-              </a:rPr>
-              <a:t>propos</a:t>
-            </a:r>
-          </a:p>
-        </p:txBody>
-      </p:sp>
-      <p:sp>
-        <p:nvSpPr>
-          <p:cNvPr id="8" name="ZoneTexte 7">
-            <a:extLst>
-              <a:ext uri="{FF2B5EF4-FFF2-40B4-BE49-F238E27FC236}">
-                <a16:creationId xmlns:a16="http://schemas.microsoft.com/office/drawing/2014/main" id="{6583BD4C-EAD6-647C-5EA2-DD829E7DB50D}"/>
-              </a:ext>
-            </a:extLst>
-          </p:cNvPr>
-          <p:cNvSpPr txBox="1"/>
-          <p:nvPr/>
-        </p:nvSpPr>
-        <p:spPr>
-          <a:xfrm>
-            <a:off x="11447012" y="160079"/>
-            <a:ext cx="692460" cy="276999"/>
-          </a:xfrm>
-          <a:prstGeom prst="rect">
-            <a:avLst/>
-          </a:prstGeom>
-          <a:noFill/>
-        </p:spPr>
-        <p:txBody>
-          <a:bodyPr wrap="square" rtlCol="0">
-            <a:spAutoFit/>
-          </a:bodyPr>
-          <a:lstStyle/>
-          <a:p>
-            <a:r>
-              <a:rPr lang="fr-CH" sz="1200" dirty="0">
-                <a:solidFill>
-                  <a:schemeClr val="bg1"/>
-                </a:solidFill>
-              </a:rPr>
-              <a:t>Login</a:t>
-            </a:r>
-          </a:p>
-        </p:txBody>
-      </p:sp>
-      <p:sp>
-        <p:nvSpPr>
-          <p:cNvPr id="9" name="ZoneTexte 8">
-            <a:extLst>
-              <a:ext uri="{FF2B5EF4-FFF2-40B4-BE49-F238E27FC236}">
-                <a16:creationId xmlns:a16="http://schemas.microsoft.com/office/drawing/2014/main" id="{06E01CCE-7BC8-F4C4-6014-C77C3C7835E7}"/>
-              </a:ext>
-            </a:extLst>
-          </p:cNvPr>
-          <p:cNvSpPr txBox="1"/>
-          <p:nvPr/>
-        </p:nvSpPr>
-        <p:spPr>
-          <a:xfrm>
-            <a:off x="169417" y="142605"/>
-            <a:ext cx="1694894" cy="276999"/>
-          </a:xfrm>
-          <a:prstGeom prst="rect">
-            <a:avLst/>
-          </a:prstGeom>
-          <a:noFill/>
-        </p:spPr>
-        <p:txBody>
-          <a:bodyPr wrap="square" rtlCol="0">
-            <a:spAutoFit/>
-          </a:bodyPr>
-          <a:lstStyle/>
-          <a:p>
-            <a:r>
-              <a:rPr lang="fr-CH" sz="1200" dirty="0">
-                <a:solidFill>
-                  <a:schemeClr val="bg1"/>
-                </a:solidFill>
-              </a:rPr>
-              <a:t>Logo &amp; Nom du site</a:t>
-            </a:r>
+            <a:r>
+              <a:rPr lang="fr-FR" dirty="0"/>
+              <a:t>BARRE DE NAVIGATION</a:t>
+            </a:r>
+            <a:endParaRPr lang="fr-CH" dirty="0"/>
           </a:p>
         </p:txBody>
       </p:sp>
@@ -3653,8 +3477,8 @@
         </p:nvSpPr>
         <p:spPr>
           <a:xfrm>
-            <a:off x="404669" y="1146699"/>
-            <a:ext cx="11042343" cy="597159"/>
+            <a:off x="574828" y="959667"/>
+            <a:ext cx="11042343" cy="5441476"/>
           </a:xfrm>
           <a:prstGeom prst="rect">
             <a:avLst/>
@@ -3691,18 +3515,79 @@
           <a:p>
             <a:pPr algn="ctr"/>
             <a:r>
-              <a:rPr lang="fr-CH" dirty="0"/>
-              <a:t>LISTE DES LOTS</a:t>
-            </a:r>
-          </a:p>
-        </p:txBody>
-      </p:sp>
-      <p:sp>
-        <p:nvSpPr>
-          <p:cNvPr id="11" name="Rectangle 10">
-            <a:extLst>
-              <a:ext uri="{FF2B5EF4-FFF2-40B4-BE49-F238E27FC236}">
-                <a16:creationId xmlns:a16="http://schemas.microsoft.com/office/drawing/2014/main" id="{7965ABEB-D8C9-C62B-E0AC-D245711D2D4C}"/>
+              <a:rPr lang="fr-FR" dirty="0"/>
+              <a:t>MOT DE BIENVENUE</a:t>
+            </a:r>
+            <a:endParaRPr lang="fr-CH" dirty="0"/>
+          </a:p>
+        </p:txBody>
+      </p:sp>
+    </p:spTree>
+    <p:extLst>
+      <p:ext uri="{BB962C8B-B14F-4D97-AF65-F5344CB8AC3E}">
+        <p14:creationId xmlns:p14="http://schemas.microsoft.com/office/powerpoint/2010/main" val="2447762908"/>
+      </p:ext>
+    </p:extLst>
+  </p:cSld>
+  <p:clrMapOvr>
+    <a:masterClrMapping/>
+  </p:clrMapOvr>
+</p:sld>
+</file>
+
+<file path=ppt/slides/slide2.xml><?xml version="1.0" encoding="utf-8"?>
+<p:sld xmlns:a="http://schemas.openxmlformats.org/drawingml/2006/main" xmlns:r="http://schemas.openxmlformats.org/officeDocument/2006/relationships" xmlns:p="http://schemas.openxmlformats.org/presentationml/2006/main">
+  <p:cSld>
+    <p:spTree>
+      <p:nvGrpSpPr>
+        <p:cNvPr id="1" name=""/>
+        <p:cNvGrpSpPr/>
+        <p:nvPr/>
+      </p:nvGrpSpPr>
+      <p:grpSpPr>
+        <a:xfrm>
+          <a:off x="0" y="0"/>
+          <a:ext cx="0" cy="0"/>
+          <a:chOff x="0" y="0"/>
+          <a:chExt cx="0" cy="0"/>
+        </a:xfrm>
+      </p:grpSpPr>
+      <p:pic>
+        <p:nvPicPr>
+          <p:cNvPr id="16" name="Image 15">
+            <a:extLst>
+              <a:ext uri="{FF2B5EF4-FFF2-40B4-BE49-F238E27FC236}">
+                <a16:creationId xmlns:a16="http://schemas.microsoft.com/office/drawing/2014/main" id="{C22C8D9B-A133-5013-5F07-36263206546A}"/>
+              </a:ext>
+            </a:extLst>
+          </p:cNvPr>
+          <p:cNvPicPr>
+            <a:picLocks noChangeAspect="1"/>
+          </p:cNvPicPr>
+          <p:nvPr/>
+        </p:nvPicPr>
+        <p:blipFill>
+          <a:blip r:embed="rId2"/>
+          <a:stretch>
+            <a:fillRect/>
+          </a:stretch>
+        </p:blipFill>
+        <p:spPr>
+          <a:xfrm>
+            <a:off x="0" y="465259"/>
+            <a:ext cx="12192000" cy="6395790"/>
+          </a:xfrm>
+          <a:prstGeom prst="rect">
+            <a:avLst/>
+          </a:prstGeom>
+        </p:spPr>
+      </p:pic>
+      <p:sp>
+        <p:nvSpPr>
+          <p:cNvPr id="4" name="Rectangle 3">
+            <a:extLst>
+              <a:ext uri="{FF2B5EF4-FFF2-40B4-BE49-F238E27FC236}">
+                <a16:creationId xmlns:a16="http://schemas.microsoft.com/office/drawing/2014/main" id="{671DC950-7CED-0154-51FD-C1606DEC1DCF}"/>
               </a:ext>
             </a:extLst>
           </p:cNvPr>
@@ -3711,15 +3596,16 @@
         </p:nvSpPr>
         <p:spPr>
           <a:xfrm>
-            <a:off x="404669" y="1734980"/>
-            <a:ext cx="11042343" cy="597159"/>
+            <a:off x="0" y="0"/>
+            <a:ext cx="12192000" cy="597159"/>
           </a:xfrm>
           <a:prstGeom prst="rect">
             <a:avLst/>
           </a:prstGeom>
           <a:solidFill>
-            <a:schemeClr val="bg2">
-              <a:lumMod val="90000"/>
+            <a:schemeClr val="tx1">
+              <a:lumMod val="75000"/>
+              <a:lumOff val="25000"/>
             </a:schemeClr>
           </a:solidFill>
           <a:ln>
@@ -3747,19 +3633,228 @@
           <a:lstStyle/>
           <a:p>
             <a:pPr algn="ctr"/>
-            <a:r>
-              <a:rPr lang="fr-CH" dirty="0"/>
-              <a:t>LOT 1</a:t>
-            </a:r>
-          </a:p>
-        </p:txBody>
-      </p:sp>
-      <p:sp>
-        <p:nvSpPr>
-          <p:cNvPr id="12" name="Rectangle 11">
-            <a:extLst>
-              <a:ext uri="{FF2B5EF4-FFF2-40B4-BE49-F238E27FC236}">
-                <a16:creationId xmlns:a16="http://schemas.microsoft.com/office/drawing/2014/main" id="{529C3B95-8D73-E64A-23F4-7FB88672502D}"/>
+            <a:endParaRPr lang="fr-CH"/>
+          </a:p>
+        </p:txBody>
+      </p:sp>
+      <p:sp>
+        <p:nvSpPr>
+          <p:cNvPr id="5" name="ZoneTexte 4">
+            <a:extLst>
+              <a:ext uri="{FF2B5EF4-FFF2-40B4-BE49-F238E27FC236}">
+                <a16:creationId xmlns:a16="http://schemas.microsoft.com/office/drawing/2014/main" id="{E0C67E48-1472-4217-D731-01EBA48072D0}"/>
+              </a:ext>
+            </a:extLst>
+          </p:cNvPr>
+          <p:cNvSpPr txBox="1"/>
+          <p:nvPr/>
+        </p:nvSpPr>
+        <p:spPr>
+          <a:xfrm>
+            <a:off x="9268287" y="160079"/>
+            <a:ext cx="692460" cy="276999"/>
+          </a:xfrm>
+          <a:prstGeom prst="rect">
+            <a:avLst/>
+          </a:prstGeom>
+          <a:noFill/>
+        </p:spPr>
+        <p:txBody>
+          <a:bodyPr wrap="square" rtlCol="0">
+            <a:spAutoFit/>
+          </a:bodyPr>
+          <a:lstStyle/>
+          <a:p>
+            <a:r>
+              <a:rPr lang="fr-CH" sz="1200" dirty="0" err="1">
+                <a:solidFill>
+                  <a:schemeClr val="bg1"/>
+                </a:solidFill>
+              </a:rPr>
+              <a:t>Acceuil</a:t>
+            </a:r>
+            <a:endParaRPr lang="fr-CH" sz="1200" dirty="0">
+              <a:solidFill>
+                <a:schemeClr val="bg1"/>
+              </a:solidFill>
+            </a:endParaRPr>
+          </a:p>
+        </p:txBody>
+      </p:sp>
+      <p:sp>
+        <p:nvSpPr>
+          <p:cNvPr id="6" name="ZoneTexte 5">
+            <a:extLst>
+              <a:ext uri="{FF2B5EF4-FFF2-40B4-BE49-F238E27FC236}">
+                <a16:creationId xmlns:a16="http://schemas.microsoft.com/office/drawing/2014/main" id="{2B763FD1-30E8-5A07-4543-5FC116E6020E}"/>
+              </a:ext>
+            </a:extLst>
+          </p:cNvPr>
+          <p:cNvSpPr txBox="1"/>
+          <p:nvPr/>
+        </p:nvSpPr>
+        <p:spPr>
+          <a:xfrm>
+            <a:off x="10062093" y="160360"/>
+            <a:ext cx="587404" cy="276999"/>
+          </a:xfrm>
+          <a:prstGeom prst="rect">
+            <a:avLst/>
+          </a:prstGeom>
+          <a:noFill/>
+        </p:spPr>
+        <p:txBody>
+          <a:bodyPr wrap="square" rtlCol="0">
+            <a:spAutoFit/>
+          </a:bodyPr>
+          <a:lstStyle/>
+          <a:p>
+            <a:r>
+              <a:rPr lang="fr-CH" sz="1200" dirty="0">
+                <a:solidFill>
+                  <a:schemeClr val="bg1"/>
+                </a:solidFill>
+              </a:rPr>
+              <a:t>Lots</a:t>
+            </a:r>
+          </a:p>
+        </p:txBody>
+      </p:sp>
+      <p:sp>
+        <p:nvSpPr>
+          <p:cNvPr id="7" name="ZoneTexte 6">
+            <a:extLst>
+              <a:ext uri="{FF2B5EF4-FFF2-40B4-BE49-F238E27FC236}">
+                <a16:creationId xmlns:a16="http://schemas.microsoft.com/office/drawing/2014/main" id="{E7E4D48E-87FF-2171-E37D-C9E77ECA0386}"/>
+              </a:ext>
+            </a:extLst>
+          </p:cNvPr>
+          <p:cNvSpPr txBox="1"/>
+          <p:nvPr/>
+        </p:nvSpPr>
+        <p:spPr>
+          <a:xfrm>
+            <a:off x="10621012" y="160079"/>
+            <a:ext cx="797515" cy="276999"/>
+          </a:xfrm>
+          <a:prstGeom prst="rect">
+            <a:avLst/>
+          </a:prstGeom>
+          <a:noFill/>
+        </p:spPr>
+        <p:txBody>
+          <a:bodyPr wrap="square" rtlCol="0">
+            <a:spAutoFit/>
+          </a:bodyPr>
+          <a:lstStyle/>
+          <a:p>
+            <a:r>
+              <a:rPr lang="fr-CH" sz="1200" dirty="0">
+                <a:solidFill>
+                  <a:schemeClr val="bg1"/>
+                </a:solidFill>
+              </a:rPr>
+              <a:t>A</a:t>
+            </a:r>
+            <a:r>
+              <a:rPr lang="fr-CH" sz="1200" dirty="0"/>
+              <a:t> </a:t>
+            </a:r>
+            <a:r>
+              <a:rPr lang="fr-CH" sz="1200" dirty="0">
+                <a:solidFill>
+                  <a:schemeClr val="bg1"/>
+                </a:solidFill>
+              </a:rPr>
+              <a:t>propos</a:t>
+            </a:r>
+          </a:p>
+        </p:txBody>
+      </p:sp>
+      <p:sp>
+        <p:nvSpPr>
+          <p:cNvPr id="8" name="ZoneTexte 7">
+            <a:extLst>
+              <a:ext uri="{FF2B5EF4-FFF2-40B4-BE49-F238E27FC236}">
+                <a16:creationId xmlns:a16="http://schemas.microsoft.com/office/drawing/2014/main" id="{6583BD4C-EAD6-647C-5EA2-DD829E7DB50D}"/>
+              </a:ext>
+            </a:extLst>
+          </p:cNvPr>
+          <p:cNvSpPr txBox="1"/>
+          <p:nvPr/>
+        </p:nvSpPr>
+        <p:spPr>
+          <a:xfrm>
+            <a:off x="11447012" y="160079"/>
+            <a:ext cx="692460" cy="276999"/>
+          </a:xfrm>
+          <a:prstGeom prst="rect">
+            <a:avLst/>
+          </a:prstGeom>
+          <a:noFill/>
+        </p:spPr>
+        <p:txBody>
+          <a:bodyPr wrap="square" rtlCol="0">
+            <a:spAutoFit/>
+          </a:bodyPr>
+          <a:lstStyle/>
+          <a:p>
+            <a:r>
+              <a:rPr lang="fr-CH" sz="1200" dirty="0">
+                <a:solidFill>
+                  <a:schemeClr val="bg1"/>
+                </a:solidFill>
+              </a:rPr>
+              <a:t>Login</a:t>
+            </a:r>
+          </a:p>
+        </p:txBody>
+      </p:sp>
+      <p:sp>
+        <p:nvSpPr>
+          <p:cNvPr id="9" name="ZoneTexte 8">
+            <a:extLst>
+              <a:ext uri="{FF2B5EF4-FFF2-40B4-BE49-F238E27FC236}">
+                <a16:creationId xmlns:a16="http://schemas.microsoft.com/office/drawing/2014/main" id="{06E01CCE-7BC8-F4C4-6014-C77C3C7835E7}"/>
+              </a:ext>
+            </a:extLst>
+          </p:cNvPr>
+          <p:cNvSpPr txBox="1"/>
+          <p:nvPr/>
+        </p:nvSpPr>
+        <p:spPr>
+          <a:xfrm>
+            <a:off x="169417" y="142605"/>
+            <a:ext cx="1694894" cy="276999"/>
+          </a:xfrm>
+          <a:prstGeom prst="rect">
+            <a:avLst/>
+          </a:prstGeom>
+          <a:noFill/>
+        </p:spPr>
+        <p:txBody>
+          <a:bodyPr wrap="square" rtlCol="0">
+            <a:spAutoFit/>
+          </a:bodyPr>
+          <a:lstStyle/>
+          <a:p>
+            <a:r>
+              <a:rPr lang="fr-CH" sz="1200" dirty="0">
+                <a:solidFill>
+                  <a:schemeClr val="bg1"/>
+                </a:solidFill>
+              </a:rPr>
+              <a:t>Logo &amp; Nom du site</a:t>
+            </a:r>
+          </a:p>
+        </p:txBody>
+      </p:sp>
+      <p:sp>
+        <p:nvSpPr>
+          <p:cNvPr id="10" name="Rectangle 9">
+            <a:extLst>
+              <a:ext uri="{FF2B5EF4-FFF2-40B4-BE49-F238E27FC236}">
+                <a16:creationId xmlns:a16="http://schemas.microsoft.com/office/drawing/2014/main" id="{5D39993D-2ACB-79DE-82FF-923B9AB98C32}"/>
               </a:ext>
             </a:extLst>
           </p:cNvPr>
@@ -3768,15 +3863,16 @@
         </p:nvSpPr>
         <p:spPr>
           <a:xfrm>
-            <a:off x="404666" y="2383623"/>
-            <a:ext cx="11042343" cy="597159"/>
+            <a:off x="574828" y="2858631"/>
+            <a:ext cx="11042343" cy="1140737"/>
           </a:xfrm>
           <a:prstGeom prst="rect">
             <a:avLst/>
           </a:prstGeom>
           <a:solidFill>
-            <a:schemeClr val="bg2">
-              <a:lumMod val="90000"/>
+            <a:schemeClr val="tx1">
+              <a:lumMod val="75000"/>
+              <a:lumOff val="25000"/>
             </a:schemeClr>
           </a:solidFill>
           <a:ln>
@@ -3805,18 +3901,79 @@
           <a:p>
             <a:pPr algn="ctr"/>
             <a:r>
-              <a:rPr lang="fr-CH" dirty="0"/>
-              <a:t>LOT 2</a:t>
-            </a:r>
-          </a:p>
-        </p:txBody>
-      </p:sp>
-      <p:sp>
-        <p:nvSpPr>
-          <p:cNvPr id="13" name="Rectangle 12">
-            <a:extLst>
-              <a:ext uri="{FF2B5EF4-FFF2-40B4-BE49-F238E27FC236}">
-                <a16:creationId xmlns:a16="http://schemas.microsoft.com/office/drawing/2014/main" id="{ADA71161-0D48-FC9B-C8AD-E8C8D271497F}"/>
+              <a:rPr lang="fr-FR" dirty="0"/>
+              <a:t>MOT DE BIENVENUE</a:t>
+            </a:r>
+            <a:endParaRPr lang="fr-CH" dirty="0"/>
+          </a:p>
+        </p:txBody>
+      </p:sp>
+    </p:spTree>
+    <p:extLst>
+      <p:ext uri="{BB962C8B-B14F-4D97-AF65-F5344CB8AC3E}">
+        <p14:creationId xmlns:p14="http://schemas.microsoft.com/office/powerpoint/2010/main" val="2764434079"/>
+      </p:ext>
+    </p:extLst>
+  </p:cSld>
+  <p:clrMapOvr>
+    <a:masterClrMapping/>
+  </p:clrMapOvr>
+</p:sld>
+</file>
+
+<file path=ppt/slides/slide3.xml><?xml version="1.0" encoding="utf-8"?>
+<p:sld xmlns:a="http://schemas.openxmlformats.org/drawingml/2006/main" xmlns:r="http://schemas.openxmlformats.org/officeDocument/2006/relationships" xmlns:p="http://schemas.openxmlformats.org/presentationml/2006/main">
+  <p:cSld>
+    <p:spTree>
+      <p:nvGrpSpPr>
+        <p:cNvPr id="1" name=""/>
+        <p:cNvGrpSpPr/>
+        <p:nvPr/>
+      </p:nvGrpSpPr>
+      <p:grpSpPr>
+        <a:xfrm>
+          <a:off x="0" y="0"/>
+          <a:ext cx="0" cy="0"/>
+          <a:chOff x="0" y="0"/>
+          <a:chExt cx="0" cy="0"/>
+        </a:xfrm>
+      </p:grpSpPr>
+      <p:pic>
+        <p:nvPicPr>
+          <p:cNvPr id="16" name="Image 15">
+            <a:extLst>
+              <a:ext uri="{FF2B5EF4-FFF2-40B4-BE49-F238E27FC236}">
+                <a16:creationId xmlns:a16="http://schemas.microsoft.com/office/drawing/2014/main" id="{C22C8D9B-A133-5013-5F07-36263206546A}"/>
+              </a:ext>
+            </a:extLst>
+          </p:cNvPr>
+          <p:cNvPicPr>
+            <a:picLocks noChangeAspect="1"/>
+          </p:cNvPicPr>
+          <p:nvPr/>
+        </p:nvPicPr>
+        <p:blipFill>
+          <a:blip r:embed="rId2"/>
+          <a:stretch>
+            <a:fillRect/>
+          </a:stretch>
+        </p:blipFill>
+        <p:spPr>
+          <a:xfrm>
+            <a:off x="0" y="465259"/>
+            <a:ext cx="12192000" cy="6395790"/>
+          </a:xfrm>
+          <a:prstGeom prst="rect">
+            <a:avLst/>
+          </a:prstGeom>
+        </p:spPr>
+      </p:pic>
+      <p:sp>
+        <p:nvSpPr>
+          <p:cNvPr id="4" name="Rectangle 3">
+            <a:extLst>
+              <a:ext uri="{FF2B5EF4-FFF2-40B4-BE49-F238E27FC236}">
+                <a16:creationId xmlns:a16="http://schemas.microsoft.com/office/drawing/2014/main" id="{671DC950-7CED-0154-51FD-C1606DEC1DCF}"/>
               </a:ext>
             </a:extLst>
           </p:cNvPr>
@@ -3825,15 +3982,16 @@
         </p:nvSpPr>
         <p:spPr>
           <a:xfrm>
-            <a:off x="404667" y="3023389"/>
-            <a:ext cx="11042343" cy="597159"/>
+            <a:off x="0" y="0"/>
+            <a:ext cx="12192000" cy="597159"/>
           </a:xfrm>
           <a:prstGeom prst="rect">
             <a:avLst/>
           </a:prstGeom>
           <a:solidFill>
-            <a:schemeClr val="bg2">
-              <a:lumMod val="90000"/>
+            <a:schemeClr val="tx1">
+              <a:lumMod val="75000"/>
+              <a:lumOff val="25000"/>
             </a:schemeClr>
           </a:solidFill>
           <a:ln>
@@ -3862,18 +4020,19 @@
           <a:p>
             <a:pPr algn="ctr"/>
             <a:r>
-              <a:rPr lang="fr-CH" dirty="0"/>
-              <a:t>LOT 3</a:t>
-            </a:r>
-          </a:p>
-        </p:txBody>
-      </p:sp>
-      <p:sp>
-        <p:nvSpPr>
-          <p:cNvPr id="14" name="Rectangle 13">
-            <a:extLst>
-              <a:ext uri="{FF2B5EF4-FFF2-40B4-BE49-F238E27FC236}">
-                <a16:creationId xmlns:a16="http://schemas.microsoft.com/office/drawing/2014/main" id="{FBF73EE9-167F-2508-5322-5E1C1409B480}"/>
+              <a:rPr lang="fr-FR" dirty="0"/>
+              <a:t>BARRE DE NAVIGATION</a:t>
+            </a:r>
+            <a:endParaRPr lang="fr-CH" dirty="0"/>
+          </a:p>
+        </p:txBody>
+      </p:sp>
+      <p:sp>
+        <p:nvSpPr>
+          <p:cNvPr id="10" name="Rectangle 9">
+            <a:extLst>
+              <a:ext uri="{FF2B5EF4-FFF2-40B4-BE49-F238E27FC236}">
+                <a16:creationId xmlns:a16="http://schemas.microsoft.com/office/drawing/2014/main" id="{5D39993D-2ACB-79DE-82FF-923B9AB98C32}"/>
               </a:ext>
             </a:extLst>
           </p:cNvPr>
@@ -3882,15 +4041,16 @@
         </p:nvSpPr>
         <p:spPr>
           <a:xfrm>
-            <a:off x="404666" y="3683202"/>
-            <a:ext cx="11042343" cy="597159"/>
+            <a:off x="574828" y="2082297"/>
+            <a:ext cx="11042343" cy="4318846"/>
           </a:xfrm>
           <a:prstGeom prst="rect">
             <a:avLst/>
           </a:prstGeom>
           <a:solidFill>
-            <a:schemeClr val="bg2">
-              <a:lumMod val="90000"/>
+            <a:schemeClr val="tx1">
+              <a:lumMod val="75000"/>
+              <a:lumOff val="25000"/>
             </a:schemeClr>
           </a:solidFill>
           <a:ln>
@@ -3919,8 +4079,12 @@
           <a:p>
             <a:pPr algn="ctr"/>
             <a:r>
+              <a:rPr lang="fr-FR" dirty="0"/>
+              <a:t>L</a:t>
+            </a:r>
+            <a:r>
               <a:rPr lang="fr-CH" dirty="0"/>
-              <a:t>LOT 4</a:t>
+              <a:t>ISTE DE TOUT LES LOTS DISPONIBLES</a:t>
             </a:r>
           </a:p>
         </p:txBody>
@@ -3939,8 +4103,8 @@
         </p:nvSpPr>
         <p:spPr>
           <a:xfrm>
-            <a:off x="10280342" y="687384"/>
-            <a:ext cx="1859130" cy="356346"/>
+            <a:off x="7460055" y="757238"/>
+            <a:ext cx="4579829" cy="1164978"/>
           </a:xfrm>
           <a:prstGeom prst="rect">
             <a:avLst/>
@@ -3985,7 +4149,795 @@
     </p:spTree>
     <p:extLst>
       <p:ext uri="{BB962C8B-B14F-4D97-AF65-F5344CB8AC3E}">
-        <p14:creationId xmlns:p14="http://schemas.microsoft.com/office/powerpoint/2010/main" val="2447762908"/>
+        <p14:creationId xmlns:p14="http://schemas.microsoft.com/office/powerpoint/2010/main" val="2609968967"/>
+      </p:ext>
+    </p:extLst>
+  </p:cSld>
+  <p:clrMapOvr>
+    <a:masterClrMapping/>
+  </p:clrMapOvr>
+</p:sld>
+</file>
+
+<file path=ppt/slides/slide4.xml><?xml version="1.0" encoding="utf-8"?>
+<p:sld xmlns:a="http://schemas.openxmlformats.org/drawingml/2006/main" xmlns:r="http://schemas.openxmlformats.org/officeDocument/2006/relationships" xmlns:p="http://schemas.openxmlformats.org/presentationml/2006/main">
+  <p:cSld>
+    <p:spTree>
+      <p:nvGrpSpPr>
+        <p:cNvPr id="1" name=""/>
+        <p:cNvGrpSpPr/>
+        <p:nvPr/>
+      </p:nvGrpSpPr>
+      <p:grpSpPr>
+        <a:xfrm>
+          <a:off x="0" y="0"/>
+          <a:ext cx="0" cy="0"/>
+          <a:chOff x="0" y="0"/>
+          <a:chExt cx="0" cy="0"/>
+        </a:xfrm>
+      </p:grpSpPr>
+      <p:pic>
+        <p:nvPicPr>
+          <p:cNvPr id="16" name="Image 15">
+            <a:extLst>
+              <a:ext uri="{FF2B5EF4-FFF2-40B4-BE49-F238E27FC236}">
+                <a16:creationId xmlns:a16="http://schemas.microsoft.com/office/drawing/2014/main" id="{C22C8D9B-A133-5013-5F07-36263206546A}"/>
+              </a:ext>
+            </a:extLst>
+          </p:cNvPr>
+          <p:cNvPicPr>
+            <a:picLocks noChangeAspect="1"/>
+          </p:cNvPicPr>
+          <p:nvPr/>
+        </p:nvPicPr>
+        <p:blipFill>
+          <a:blip r:embed="rId2"/>
+          <a:stretch>
+            <a:fillRect/>
+          </a:stretch>
+        </p:blipFill>
+        <p:spPr>
+          <a:xfrm>
+            <a:off x="0" y="465259"/>
+            <a:ext cx="12192000" cy="6395790"/>
+          </a:xfrm>
+          <a:prstGeom prst="rect">
+            <a:avLst/>
+          </a:prstGeom>
+        </p:spPr>
+      </p:pic>
+      <p:sp>
+        <p:nvSpPr>
+          <p:cNvPr id="4" name="Rectangle 3">
+            <a:extLst>
+              <a:ext uri="{FF2B5EF4-FFF2-40B4-BE49-F238E27FC236}">
+                <a16:creationId xmlns:a16="http://schemas.microsoft.com/office/drawing/2014/main" id="{671DC950-7CED-0154-51FD-C1606DEC1DCF}"/>
+              </a:ext>
+            </a:extLst>
+          </p:cNvPr>
+          <p:cNvSpPr/>
+          <p:nvPr/>
+        </p:nvSpPr>
+        <p:spPr>
+          <a:xfrm>
+            <a:off x="0" y="0"/>
+            <a:ext cx="12192000" cy="597159"/>
+          </a:xfrm>
+          <a:prstGeom prst="rect">
+            <a:avLst/>
+          </a:prstGeom>
+          <a:solidFill>
+            <a:schemeClr val="tx1">
+              <a:lumMod val="75000"/>
+              <a:lumOff val="25000"/>
+            </a:schemeClr>
+          </a:solidFill>
+          <a:ln>
+            <a:noFill/>
+          </a:ln>
+        </p:spPr>
+        <p:style>
+          <a:lnRef idx="2">
+            <a:schemeClr val="dk1">
+              <a:shade val="15000"/>
+            </a:schemeClr>
+          </a:lnRef>
+          <a:fillRef idx="1">
+            <a:schemeClr val="dk1"/>
+          </a:fillRef>
+          <a:effectRef idx="0">
+            <a:schemeClr val="dk1"/>
+          </a:effectRef>
+          <a:fontRef idx="minor">
+            <a:schemeClr val="lt1"/>
+          </a:fontRef>
+        </p:style>
+        <p:txBody>
+          <a:bodyPr rtlCol="0" anchor="ctr"/>
+          <a:lstStyle/>
+          <a:p>
+            <a:pPr algn="ctr"/>
+            <a:endParaRPr lang="fr-CH"/>
+          </a:p>
+        </p:txBody>
+      </p:sp>
+      <p:sp>
+        <p:nvSpPr>
+          <p:cNvPr id="5" name="ZoneTexte 4">
+            <a:extLst>
+              <a:ext uri="{FF2B5EF4-FFF2-40B4-BE49-F238E27FC236}">
+                <a16:creationId xmlns:a16="http://schemas.microsoft.com/office/drawing/2014/main" id="{E0C67E48-1472-4217-D731-01EBA48072D0}"/>
+              </a:ext>
+            </a:extLst>
+          </p:cNvPr>
+          <p:cNvSpPr txBox="1"/>
+          <p:nvPr/>
+        </p:nvSpPr>
+        <p:spPr>
+          <a:xfrm>
+            <a:off x="9268287" y="160079"/>
+            <a:ext cx="692460" cy="276999"/>
+          </a:xfrm>
+          <a:prstGeom prst="rect">
+            <a:avLst/>
+          </a:prstGeom>
+          <a:noFill/>
+        </p:spPr>
+        <p:txBody>
+          <a:bodyPr wrap="square" rtlCol="0">
+            <a:spAutoFit/>
+          </a:bodyPr>
+          <a:lstStyle/>
+          <a:p>
+            <a:r>
+              <a:rPr lang="fr-CH" sz="1200" dirty="0" err="1">
+                <a:solidFill>
+                  <a:schemeClr val="bg1"/>
+                </a:solidFill>
+              </a:rPr>
+              <a:t>Acceuil</a:t>
+            </a:r>
+            <a:endParaRPr lang="fr-CH" sz="1200" dirty="0">
+              <a:solidFill>
+                <a:schemeClr val="bg1"/>
+              </a:solidFill>
+            </a:endParaRPr>
+          </a:p>
+        </p:txBody>
+      </p:sp>
+      <p:sp>
+        <p:nvSpPr>
+          <p:cNvPr id="6" name="ZoneTexte 5">
+            <a:extLst>
+              <a:ext uri="{FF2B5EF4-FFF2-40B4-BE49-F238E27FC236}">
+                <a16:creationId xmlns:a16="http://schemas.microsoft.com/office/drawing/2014/main" id="{2B763FD1-30E8-5A07-4543-5FC116E6020E}"/>
+              </a:ext>
+            </a:extLst>
+          </p:cNvPr>
+          <p:cNvSpPr txBox="1"/>
+          <p:nvPr/>
+        </p:nvSpPr>
+        <p:spPr>
+          <a:xfrm>
+            <a:off x="10062093" y="160360"/>
+            <a:ext cx="587404" cy="276999"/>
+          </a:xfrm>
+          <a:prstGeom prst="rect">
+            <a:avLst/>
+          </a:prstGeom>
+          <a:noFill/>
+        </p:spPr>
+        <p:txBody>
+          <a:bodyPr wrap="square" rtlCol="0">
+            <a:spAutoFit/>
+          </a:bodyPr>
+          <a:lstStyle/>
+          <a:p>
+            <a:r>
+              <a:rPr lang="fr-CH" sz="1200" dirty="0">
+                <a:solidFill>
+                  <a:schemeClr val="bg1"/>
+                </a:solidFill>
+              </a:rPr>
+              <a:t>Lots</a:t>
+            </a:r>
+          </a:p>
+        </p:txBody>
+      </p:sp>
+      <p:sp>
+        <p:nvSpPr>
+          <p:cNvPr id="7" name="ZoneTexte 6">
+            <a:extLst>
+              <a:ext uri="{FF2B5EF4-FFF2-40B4-BE49-F238E27FC236}">
+                <a16:creationId xmlns:a16="http://schemas.microsoft.com/office/drawing/2014/main" id="{E7E4D48E-87FF-2171-E37D-C9E77ECA0386}"/>
+              </a:ext>
+            </a:extLst>
+          </p:cNvPr>
+          <p:cNvSpPr txBox="1"/>
+          <p:nvPr/>
+        </p:nvSpPr>
+        <p:spPr>
+          <a:xfrm>
+            <a:off x="10621012" y="160079"/>
+            <a:ext cx="797515" cy="276999"/>
+          </a:xfrm>
+          <a:prstGeom prst="rect">
+            <a:avLst/>
+          </a:prstGeom>
+          <a:noFill/>
+        </p:spPr>
+        <p:txBody>
+          <a:bodyPr wrap="square" rtlCol="0">
+            <a:spAutoFit/>
+          </a:bodyPr>
+          <a:lstStyle/>
+          <a:p>
+            <a:r>
+              <a:rPr lang="fr-CH" sz="1200" dirty="0">
+                <a:solidFill>
+                  <a:schemeClr val="bg1"/>
+                </a:solidFill>
+              </a:rPr>
+              <a:t>A</a:t>
+            </a:r>
+            <a:r>
+              <a:rPr lang="fr-CH" sz="1200" dirty="0"/>
+              <a:t> </a:t>
+            </a:r>
+            <a:r>
+              <a:rPr lang="fr-CH" sz="1200" dirty="0">
+                <a:solidFill>
+                  <a:schemeClr val="bg1"/>
+                </a:solidFill>
+              </a:rPr>
+              <a:t>propos</a:t>
+            </a:r>
+          </a:p>
+        </p:txBody>
+      </p:sp>
+      <p:sp>
+        <p:nvSpPr>
+          <p:cNvPr id="8" name="ZoneTexte 7">
+            <a:extLst>
+              <a:ext uri="{FF2B5EF4-FFF2-40B4-BE49-F238E27FC236}">
+                <a16:creationId xmlns:a16="http://schemas.microsoft.com/office/drawing/2014/main" id="{6583BD4C-EAD6-647C-5EA2-DD829E7DB50D}"/>
+              </a:ext>
+            </a:extLst>
+          </p:cNvPr>
+          <p:cNvSpPr txBox="1"/>
+          <p:nvPr/>
+        </p:nvSpPr>
+        <p:spPr>
+          <a:xfrm>
+            <a:off x="11447012" y="160079"/>
+            <a:ext cx="692460" cy="276999"/>
+          </a:xfrm>
+          <a:prstGeom prst="rect">
+            <a:avLst/>
+          </a:prstGeom>
+          <a:noFill/>
+        </p:spPr>
+        <p:txBody>
+          <a:bodyPr wrap="square" rtlCol="0">
+            <a:spAutoFit/>
+          </a:bodyPr>
+          <a:lstStyle/>
+          <a:p>
+            <a:r>
+              <a:rPr lang="fr-CH" sz="1200" dirty="0">
+                <a:solidFill>
+                  <a:schemeClr val="bg1"/>
+                </a:solidFill>
+              </a:rPr>
+              <a:t>Login</a:t>
+            </a:r>
+          </a:p>
+        </p:txBody>
+      </p:sp>
+      <p:sp>
+        <p:nvSpPr>
+          <p:cNvPr id="9" name="ZoneTexte 8">
+            <a:extLst>
+              <a:ext uri="{FF2B5EF4-FFF2-40B4-BE49-F238E27FC236}">
+                <a16:creationId xmlns:a16="http://schemas.microsoft.com/office/drawing/2014/main" id="{06E01CCE-7BC8-F4C4-6014-C77C3C7835E7}"/>
+              </a:ext>
+            </a:extLst>
+          </p:cNvPr>
+          <p:cNvSpPr txBox="1"/>
+          <p:nvPr/>
+        </p:nvSpPr>
+        <p:spPr>
+          <a:xfrm>
+            <a:off x="169417" y="142605"/>
+            <a:ext cx="1694894" cy="276999"/>
+          </a:xfrm>
+          <a:prstGeom prst="rect">
+            <a:avLst/>
+          </a:prstGeom>
+          <a:noFill/>
+        </p:spPr>
+        <p:txBody>
+          <a:bodyPr wrap="square" rtlCol="0">
+            <a:spAutoFit/>
+          </a:bodyPr>
+          <a:lstStyle/>
+          <a:p>
+            <a:r>
+              <a:rPr lang="fr-CH" sz="1200" dirty="0">
+                <a:solidFill>
+                  <a:schemeClr val="bg1"/>
+                </a:solidFill>
+              </a:rPr>
+              <a:t>Logo &amp; Nom du site</a:t>
+            </a:r>
+          </a:p>
+        </p:txBody>
+      </p:sp>
+      <p:sp>
+        <p:nvSpPr>
+          <p:cNvPr id="10" name="Rectangle 9">
+            <a:extLst>
+              <a:ext uri="{FF2B5EF4-FFF2-40B4-BE49-F238E27FC236}">
+                <a16:creationId xmlns:a16="http://schemas.microsoft.com/office/drawing/2014/main" id="{5D39993D-2ACB-79DE-82FF-923B9AB98C32}"/>
+              </a:ext>
+            </a:extLst>
+          </p:cNvPr>
+          <p:cNvSpPr/>
+          <p:nvPr/>
+        </p:nvSpPr>
+        <p:spPr>
+          <a:xfrm>
+            <a:off x="404666" y="2472711"/>
+            <a:ext cx="11042343" cy="597159"/>
+          </a:xfrm>
+          <a:prstGeom prst="rect">
+            <a:avLst/>
+          </a:prstGeom>
+          <a:solidFill>
+            <a:schemeClr val="tx1">
+              <a:lumMod val="75000"/>
+              <a:lumOff val="25000"/>
+            </a:schemeClr>
+          </a:solidFill>
+          <a:ln>
+            <a:noFill/>
+          </a:ln>
+        </p:spPr>
+        <p:style>
+          <a:lnRef idx="2">
+            <a:schemeClr val="dk1">
+              <a:shade val="15000"/>
+            </a:schemeClr>
+          </a:lnRef>
+          <a:fillRef idx="1">
+            <a:schemeClr val="dk1"/>
+          </a:fillRef>
+          <a:effectRef idx="0">
+            <a:schemeClr val="dk1"/>
+          </a:effectRef>
+          <a:fontRef idx="minor">
+            <a:schemeClr val="lt1"/>
+          </a:fontRef>
+        </p:style>
+        <p:txBody>
+          <a:bodyPr rtlCol="0" anchor="ctr"/>
+          <a:lstStyle/>
+          <a:p>
+            <a:pPr algn="ctr"/>
+            <a:r>
+              <a:rPr lang="fr-CH" dirty="0"/>
+              <a:t>LISTE DES LOTS</a:t>
+            </a:r>
+          </a:p>
+        </p:txBody>
+      </p:sp>
+      <p:sp>
+        <p:nvSpPr>
+          <p:cNvPr id="11" name="Rectangle 10">
+            <a:extLst>
+              <a:ext uri="{FF2B5EF4-FFF2-40B4-BE49-F238E27FC236}">
+                <a16:creationId xmlns:a16="http://schemas.microsoft.com/office/drawing/2014/main" id="{7965ABEB-D8C9-C62B-E0AC-D245711D2D4C}"/>
+              </a:ext>
+            </a:extLst>
+          </p:cNvPr>
+          <p:cNvSpPr/>
+          <p:nvPr/>
+        </p:nvSpPr>
+        <p:spPr>
+          <a:xfrm>
+            <a:off x="404666" y="3069870"/>
+            <a:ext cx="11042343" cy="597159"/>
+          </a:xfrm>
+          <a:prstGeom prst="rect">
+            <a:avLst/>
+          </a:prstGeom>
+          <a:solidFill>
+            <a:schemeClr val="bg2">
+              <a:lumMod val="90000"/>
+            </a:schemeClr>
+          </a:solidFill>
+          <a:ln>
+            <a:noFill/>
+          </a:ln>
+        </p:spPr>
+        <p:style>
+          <a:lnRef idx="2">
+            <a:schemeClr val="dk1">
+              <a:shade val="15000"/>
+            </a:schemeClr>
+          </a:lnRef>
+          <a:fillRef idx="1">
+            <a:schemeClr val="dk1"/>
+          </a:fillRef>
+          <a:effectRef idx="0">
+            <a:schemeClr val="dk1"/>
+          </a:effectRef>
+          <a:fontRef idx="minor">
+            <a:schemeClr val="lt1"/>
+          </a:fontRef>
+        </p:style>
+        <p:txBody>
+          <a:bodyPr rtlCol="0" anchor="ctr"/>
+          <a:lstStyle/>
+          <a:p>
+            <a:pPr algn="ctr"/>
+            <a:r>
+              <a:rPr lang="fr-CH" dirty="0"/>
+              <a:t>LOT 1</a:t>
+            </a:r>
+          </a:p>
+        </p:txBody>
+      </p:sp>
+      <p:sp>
+        <p:nvSpPr>
+          <p:cNvPr id="12" name="Rectangle 11">
+            <a:extLst>
+              <a:ext uri="{FF2B5EF4-FFF2-40B4-BE49-F238E27FC236}">
+                <a16:creationId xmlns:a16="http://schemas.microsoft.com/office/drawing/2014/main" id="{529C3B95-8D73-E64A-23F4-7FB88672502D}"/>
+              </a:ext>
+            </a:extLst>
+          </p:cNvPr>
+          <p:cNvSpPr/>
+          <p:nvPr/>
+        </p:nvSpPr>
+        <p:spPr>
+          <a:xfrm>
+            <a:off x="404666" y="3736380"/>
+            <a:ext cx="11042343" cy="597159"/>
+          </a:xfrm>
+          <a:prstGeom prst="rect">
+            <a:avLst/>
+          </a:prstGeom>
+          <a:solidFill>
+            <a:schemeClr val="bg2">
+              <a:lumMod val="90000"/>
+            </a:schemeClr>
+          </a:solidFill>
+          <a:ln>
+            <a:noFill/>
+          </a:ln>
+        </p:spPr>
+        <p:style>
+          <a:lnRef idx="2">
+            <a:schemeClr val="dk1">
+              <a:shade val="15000"/>
+            </a:schemeClr>
+          </a:lnRef>
+          <a:fillRef idx="1">
+            <a:schemeClr val="dk1"/>
+          </a:fillRef>
+          <a:effectRef idx="0">
+            <a:schemeClr val="dk1"/>
+          </a:effectRef>
+          <a:fontRef idx="minor">
+            <a:schemeClr val="lt1"/>
+          </a:fontRef>
+        </p:style>
+        <p:txBody>
+          <a:bodyPr rtlCol="0" anchor="ctr"/>
+          <a:lstStyle/>
+          <a:p>
+            <a:pPr algn="ctr"/>
+            <a:r>
+              <a:rPr lang="fr-CH" dirty="0"/>
+              <a:t>LOT 2</a:t>
+            </a:r>
+          </a:p>
+        </p:txBody>
+      </p:sp>
+      <p:sp>
+        <p:nvSpPr>
+          <p:cNvPr id="13" name="Rectangle 12">
+            <a:extLst>
+              <a:ext uri="{FF2B5EF4-FFF2-40B4-BE49-F238E27FC236}">
+                <a16:creationId xmlns:a16="http://schemas.microsoft.com/office/drawing/2014/main" id="{ADA71161-0D48-FC9B-C8AD-E8C8D271497F}"/>
+              </a:ext>
+            </a:extLst>
+          </p:cNvPr>
+          <p:cNvSpPr/>
+          <p:nvPr/>
+        </p:nvSpPr>
+        <p:spPr>
+          <a:xfrm>
+            <a:off x="404666" y="4405597"/>
+            <a:ext cx="11042343" cy="597159"/>
+          </a:xfrm>
+          <a:prstGeom prst="rect">
+            <a:avLst/>
+          </a:prstGeom>
+          <a:solidFill>
+            <a:schemeClr val="bg2">
+              <a:lumMod val="90000"/>
+            </a:schemeClr>
+          </a:solidFill>
+          <a:ln>
+            <a:noFill/>
+          </a:ln>
+        </p:spPr>
+        <p:style>
+          <a:lnRef idx="2">
+            <a:schemeClr val="dk1">
+              <a:shade val="15000"/>
+            </a:schemeClr>
+          </a:lnRef>
+          <a:fillRef idx="1">
+            <a:schemeClr val="dk1"/>
+          </a:fillRef>
+          <a:effectRef idx="0">
+            <a:schemeClr val="dk1"/>
+          </a:effectRef>
+          <a:fontRef idx="minor">
+            <a:schemeClr val="lt1"/>
+          </a:fontRef>
+        </p:style>
+        <p:txBody>
+          <a:bodyPr rtlCol="0" anchor="ctr"/>
+          <a:lstStyle/>
+          <a:p>
+            <a:pPr algn="ctr"/>
+            <a:r>
+              <a:rPr lang="fr-CH" dirty="0"/>
+              <a:t>LOT 3</a:t>
+            </a:r>
+          </a:p>
+        </p:txBody>
+      </p:sp>
+      <p:sp>
+        <p:nvSpPr>
+          <p:cNvPr id="14" name="Rectangle 13">
+            <a:extLst>
+              <a:ext uri="{FF2B5EF4-FFF2-40B4-BE49-F238E27FC236}">
+                <a16:creationId xmlns:a16="http://schemas.microsoft.com/office/drawing/2014/main" id="{FBF73EE9-167F-2508-5322-5E1C1409B480}"/>
+              </a:ext>
+            </a:extLst>
+          </p:cNvPr>
+          <p:cNvSpPr/>
+          <p:nvPr/>
+        </p:nvSpPr>
+        <p:spPr>
+          <a:xfrm>
+            <a:off x="404666" y="5074814"/>
+            <a:ext cx="11042343" cy="597159"/>
+          </a:xfrm>
+          <a:prstGeom prst="rect">
+            <a:avLst/>
+          </a:prstGeom>
+          <a:solidFill>
+            <a:schemeClr val="bg2">
+              <a:lumMod val="90000"/>
+            </a:schemeClr>
+          </a:solidFill>
+          <a:ln>
+            <a:noFill/>
+          </a:ln>
+        </p:spPr>
+        <p:style>
+          <a:lnRef idx="2">
+            <a:schemeClr val="dk1">
+              <a:shade val="15000"/>
+            </a:schemeClr>
+          </a:lnRef>
+          <a:fillRef idx="1">
+            <a:schemeClr val="dk1"/>
+          </a:fillRef>
+          <a:effectRef idx="0">
+            <a:schemeClr val="dk1"/>
+          </a:effectRef>
+          <a:fontRef idx="minor">
+            <a:schemeClr val="lt1"/>
+          </a:fontRef>
+        </p:style>
+        <p:txBody>
+          <a:bodyPr rtlCol="0" anchor="ctr"/>
+          <a:lstStyle/>
+          <a:p>
+            <a:pPr algn="ctr"/>
+            <a:r>
+              <a:rPr lang="fr-CH" dirty="0"/>
+              <a:t>LOT 4</a:t>
+            </a:r>
+          </a:p>
+        </p:txBody>
+      </p:sp>
+      <p:sp>
+        <p:nvSpPr>
+          <p:cNvPr id="17" name="Rectangle 16">
+            <a:extLst>
+              <a:ext uri="{FF2B5EF4-FFF2-40B4-BE49-F238E27FC236}">
+                <a16:creationId xmlns:a16="http://schemas.microsoft.com/office/drawing/2014/main" id="{19C72FD9-82FB-9DB0-ECE6-D1A4FE02450A}"/>
+              </a:ext>
+            </a:extLst>
+          </p:cNvPr>
+          <p:cNvSpPr/>
+          <p:nvPr/>
+        </p:nvSpPr>
+        <p:spPr>
+          <a:xfrm>
+            <a:off x="10280342" y="687384"/>
+            <a:ext cx="1859130" cy="356346"/>
+          </a:xfrm>
+          <a:prstGeom prst="rect">
+            <a:avLst/>
+          </a:prstGeom>
+          <a:solidFill>
+            <a:schemeClr val="bg2">
+              <a:lumMod val="90000"/>
+            </a:schemeClr>
+          </a:solidFill>
+          <a:ln>
+            <a:noFill/>
+          </a:ln>
+        </p:spPr>
+        <p:style>
+          <a:lnRef idx="2">
+            <a:schemeClr val="dk1">
+              <a:shade val="15000"/>
+            </a:schemeClr>
+          </a:lnRef>
+          <a:fillRef idx="1">
+            <a:schemeClr val="dk1"/>
+          </a:fillRef>
+          <a:effectRef idx="0">
+            <a:schemeClr val="dk1"/>
+          </a:effectRef>
+          <a:fontRef idx="minor">
+            <a:schemeClr val="lt1"/>
+          </a:fontRef>
+        </p:style>
+        <p:txBody>
+          <a:bodyPr rtlCol="0" anchor="ctr"/>
+          <a:lstStyle/>
+          <a:p>
+            <a:pPr algn="ctr"/>
+            <a:r>
+              <a:rPr lang="fr-CH" sz="1400" dirty="0"/>
+              <a:t>Barre de recherche</a:t>
+            </a:r>
+          </a:p>
+        </p:txBody>
+      </p:sp>
+      <p:sp>
+        <p:nvSpPr>
+          <p:cNvPr id="2" name="Rectangle 1">
+            <a:extLst>
+              <a:ext uri="{FF2B5EF4-FFF2-40B4-BE49-F238E27FC236}">
+                <a16:creationId xmlns:a16="http://schemas.microsoft.com/office/drawing/2014/main" id="{2BC00D52-1833-B3E9-D574-FFF45F3EFB7A}"/>
+              </a:ext>
+            </a:extLst>
+          </p:cNvPr>
+          <p:cNvSpPr/>
+          <p:nvPr/>
+        </p:nvSpPr>
+        <p:spPr>
+          <a:xfrm>
+            <a:off x="10280342" y="1129337"/>
+            <a:ext cx="1859130" cy="356346"/>
+          </a:xfrm>
+          <a:prstGeom prst="rect">
+            <a:avLst/>
+          </a:prstGeom>
+          <a:solidFill>
+            <a:schemeClr val="bg2">
+              <a:lumMod val="90000"/>
+            </a:schemeClr>
+          </a:solidFill>
+          <a:ln>
+            <a:noFill/>
+          </a:ln>
+        </p:spPr>
+        <p:style>
+          <a:lnRef idx="2">
+            <a:schemeClr val="dk1">
+              <a:shade val="15000"/>
+            </a:schemeClr>
+          </a:lnRef>
+          <a:fillRef idx="1">
+            <a:schemeClr val="dk1"/>
+          </a:fillRef>
+          <a:effectRef idx="0">
+            <a:schemeClr val="dk1"/>
+          </a:effectRef>
+          <a:fontRef idx="minor">
+            <a:schemeClr val="lt1"/>
+          </a:fontRef>
+        </p:style>
+        <p:txBody>
+          <a:bodyPr rtlCol="0" anchor="ctr"/>
+          <a:lstStyle/>
+          <a:p>
+            <a:pPr algn="ctr"/>
+            <a:r>
+              <a:rPr lang="fr-CH" sz="1400" dirty="0"/>
+              <a:t>Filtre de recherche</a:t>
+            </a:r>
+          </a:p>
+        </p:txBody>
+      </p:sp>
+      <p:sp>
+        <p:nvSpPr>
+          <p:cNvPr id="3" name="Rectangle 2">
+            <a:extLst>
+              <a:ext uri="{FF2B5EF4-FFF2-40B4-BE49-F238E27FC236}">
+                <a16:creationId xmlns:a16="http://schemas.microsoft.com/office/drawing/2014/main" id="{F20EB147-986E-4342-282D-EA2041232893}"/>
+              </a:ext>
+            </a:extLst>
+          </p:cNvPr>
+          <p:cNvSpPr/>
+          <p:nvPr/>
+        </p:nvSpPr>
+        <p:spPr>
+          <a:xfrm>
+            <a:off x="10280342" y="1557847"/>
+            <a:ext cx="1859130" cy="356346"/>
+          </a:xfrm>
+          <a:prstGeom prst="rect">
+            <a:avLst/>
+          </a:prstGeom>
+          <a:solidFill>
+            <a:schemeClr val="bg2">
+              <a:lumMod val="90000"/>
+            </a:schemeClr>
+          </a:solidFill>
+          <a:ln>
+            <a:noFill/>
+          </a:ln>
+        </p:spPr>
+        <p:style>
+          <a:lnRef idx="2">
+            <a:schemeClr val="dk1">
+              <a:shade val="15000"/>
+            </a:schemeClr>
+          </a:lnRef>
+          <a:fillRef idx="1">
+            <a:schemeClr val="dk1"/>
+          </a:fillRef>
+          <a:effectRef idx="0">
+            <a:schemeClr val="dk1"/>
+          </a:effectRef>
+          <a:fontRef idx="minor">
+            <a:schemeClr val="lt1"/>
+          </a:fontRef>
+        </p:style>
+        <p:txBody>
+          <a:bodyPr rtlCol="0" anchor="ctr"/>
+          <a:lstStyle/>
+          <a:p>
+            <a:pPr algn="ctr"/>
+            <a:r>
+              <a:rPr lang="fr-CH" sz="1400" dirty="0" err="1"/>
+              <a:t>Filtrede</a:t>
+            </a:r>
+            <a:r>
+              <a:rPr lang="fr-CH" sz="1400" dirty="0"/>
+              <a:t> recherche</a:t>
+            </a:r>
+          </a:p>
+        </p:txBody>
+      </p:sp>
+    </p:spTree>
+    <p:extLst>
+      <p:ext uri="{BB962C8B-B14F-4D97-AF65-F5344CB8AC3E}">
+        <p14:creationId xmlns:p14="http://schemas.microsoft.com/office/powerpoint/2010/main" val="1862207691"/>
       </p:ext>
     </p:extLst>
   </p:cSld>

</xml_diff>

<commit_message>
Amelioration v2 du MOCKUP
</commit_message>
<xml_diff>
--- a/Annexes/MockupEnchere.pptx
+++ b/Annexes/MockupEnchere.pptx
@@ -3844,7 +3844,7 @@
                   <a:schemeClr val="bg1"/>
                 </a:solidFill>
               </a:rPr>
-              <a:t>Logo &amp; Nom du site</a:t>
+              <a:t>(Logo) RIZCARDEAU</a:t>
             </a:r>
           </a:p>
         </p:txBody>
@@ -4468,7 +4468,7 @@
                   <a:schemeClr val="bg1"/>
                 </a:solidFill>
               </a:rPr>
-              <a:t>Logo &amp; Nom du site</a:t>
+              <a:t>(Logo) RIZCARDEAU</a:t>
             </a:r>
           </a:p>
         </p:txBody>
@@ -4525,8 +4525,12 @@
           <a:p>
             <a:pPr algn="ctr"/>
             <a:r>
-              <a:rPr lang="fr-CH" dirty="0"/>
-              <a:t>LISTE DES LOTS</a:t>
+              <a:rPr lang="fr-FR" sz="1400" dirty="0"/>
+              <a:t>C</a:t>
+            </a:r>
+            <a:r>
+              <a:rPr lang="fr-CH" sz="1400" dirty="0"/>
+              <a:t>ATEGORIE            SOUS-CATEGORIE             NUMERO DE LOT NOM             DESCRIPTION             PRIX DE DEPART            DETAILS</a:t>
             </a:r>
           </a:p>
         </p:txBody>
@@ -4582,9 +4586,10 @@
           <a:p>
             <a:pPr algn="ctr"/>
             <a:r>
-              <a:rPr lang="fr-CH" dirty="0"/>
-              <a:t>LOT 1</a:t>
-            </a:r>
+              <a:rPr lang="fr-FR" dirty="0"/>
+              <a:t>LOT 1 </a:t>
+            </a:r>
+            <a:endParaRPr lang="fr-CH" dirty="0"/>
           </a:p>
         </p:txBody>
       </p:sp>
@@ -4830,7 +4835,7 @@
         </p:nvSpPr>
         <p:spPr>
           <a:xfrm>
-            <a:off x="10280342" y="1129337"/>
+            <a:off x="10280342" y="1120284"/>
             <a:ext cx="1859130" cy="356346"/>
           </a:xfrm>
           <a:prstGeom prst="rect">
@@ -4868,7 +4873,7 @@
             <a:pPr algn="ctr"/>
             <a:r>
               <a:rPr lang="fr-CH" sz="1400" dirty="0"/>
-              <a:t>Filtre de recherche</a:t>
+              <a:t>Filtre catégorie</a:t>
             </a:r>
           </a:p>
         </p:txBody>
@@ -4924,12 +4929,8 @@
           <a:p>
             <a:pPr algn="ctr"/>
             <a:r>
-              <a:rPr lang="fr-CH" sz="1400" dirty="0" err="1"/>
-              <a:t>Filtrede</a:t>
-            </a:r>
-            <a:r>
               <a:rPr lang="fr-CH" sz="1400" dirty="0"/>
-              <a:t> recherche</a:t>
+              <a:t>Filtre sous-catégorie</a:t>
             </a:r>
           </a:p>
         </p:txBody>

</xml_diff>

<commit_message>
Fix : Mise a jour Mockup
</commit_message>
<xml_diff>
--- a/Annexes/MockupEnchere.pptx
+++ b/Annexes/MockupEnchere.pptx
@@ -9,6 +9,10 @@
     <p:sldId id="257" r:id="rId3"/>
     <p:sldId id="258" r:id="rId4"/>
     <p:sldId id="259" r:id="rId5"/>
+    <p:sldId id="260" r:id="rId6"/>
+    <p:sldId id="261" r:id="rId7"/>
+    <p:sldId id="262" r:id="rId8"/>
+    <p:sldId id="263" r:id="rId9"/>
   </p:sldIdLst>
   <p:sldSz cx="12192000" cy="6858000"/>
   <p:notesSz cx="6858000" cy="9144000"/>
@@ -130,6 +134,26 @@
             <p14:sldId id="259"/>
           </p14:sldIdLst>
         </p14:section>
+        <p14:section name="ZONING PAGE LOGIN" id="{54D08D2C-E81F-4F06-BEB9-E720F8E63E3B}">
+          <p14:sldIdLst>
+            <p14:sldId id="260"/>
+          </p14:sldIdLst>
+        </p14:section>
+        <p14:section name="MOCKUP PAGE LOGIN" id="{DF8A27F0-EA07-4D02-802F-6A8AA830844B}">
+          <p14:sldIdLst>
+            <p14:sldId id="261"/>
+          </p14:sldIdLst>
+        </p14:section>
+        <p14:section name="ZONING PAGE PROFIL" id="{05050927-76E8-40BA-B4A8-033012991E24}">
+          <p14:sldIdLst>
+            <p14:sldId id="262"/>
+          </p14:sldIdLst>
+        </p14:section>
+        <p14:section name="MOCKUP PAGE PROFIL" id="{9D474265-39E2-4E62-9288-E0467AF6796A}">
+          <p14:sldIdLst>
+            <p14:sldId id="263"/>
+          </p14:sldIdLst>
+        </p14:section>
       </p14:sectionLst>
     </p:ext>
     <p:ext uri="{EFAFB233-063F-42B5-8137-9DF3F51BA10A}">
@@ -288,7 +312,7 @@
           <a:p>
             <a:fld id="{E5321D17-A8A2-4BD7-9C7D-8DAECA7660B1}" type="datetimeFigureOut">
               <a:rPr lang="fr-CH" smtClean="0"/>
-              <a:t>17.05.2024</a:t>
+              <a:t>30.05.2024</a:t>
             </a:fld>
             <a:endParaRPr lang="fr-CH"/>
           </a:p>
@@ -488,7 +512,7 @@
           <a:p>
             <a:fld id="{E5321D17-A8A2-4BD7-9C7D-8DAECA7660B1}" type="datetimeFigureOut">
               <a:rPr lang="fr-CH" smtClean="0"/>
-              <a:t>17.05.2024</a:t>
+              <a:t>30.05.2024</a:t>
             </a:fld>
             <a:endParaRPr lang="fr-CH"/>
           </a:p>
@@ -698,7 +722,7 @@
           <a:p>
             <a:fld id="{E5321D17-A8A2-4BD7-9C7D-8DAECA7660B1}" type="datetimeFigureOut">
               <a:rPr lang="fr-CH" smtClean="0"/>
-              <a:t>17.05.2024</a:t>
+              <a:t>30.05.2024</a:t>
             </a:fld>
             <a:endParaRPr lang="fr-CH"/>
           </a:p>
@@ -898,7 +922,7 @@
           <a:p>
             <a:fld id="{E5321D17-A8A2-4BD7-9C7D-8DAECA7660B1}" type="datetimeFigureOut">
               <a:rPr lang="fr-CH" smtClean="0"/>
-              <a:t>17.05.2024</a:t>
+              <a:t>30.05.2024</a:t>
             </a:fld>
             <a:endParaRPr lang="fr-CH"/>
           </a:p>
@@ -1174,7 +1198,7 @@
           <a:p>
             <a:fld id="{E5321D17-A8A2-4BD7-9C7D-8DAECA7660B1}" type="datetimeFigureOut">
               <a:rPr lang="fr-CH" smtClean="0"/>
-              <a:t>17.05.2024</a:t>
+              <a:t>30.05.2024</a:t>
             </a:fld>
             <a:endParaRPr lang="fr-CH"/>
           </a:p>
@@ -1442,7 +1466,7 @@
           <a:p>
             <a:fld id="{E5321D17-A8A2-4BD7-9C7D-8DAECA7660B1}" type="datetimeFigureOut">
               <a:rPr lang="fr-CH" smtClean="0"/>
-              <a:t>17.05.2024</a:t>
+              <a:t>30.05.2024</a:t>
             </a:fld>
             <a:endParaRPr lang="fr-CH"/>
           </a:p>
@@ -1857,7 +1881,7 @@
           <a:p>
             <a:fld id="{E5321D17-A8A2-4BD7-9C7D-8DAECA7660B1}" type="datetimeFigureOut">
               <a:rPr lang="fr-CH" smtClean="0"/>
-              <a:t>17.05.2024</a:t>
+              <a:t>30.05.2024</a:t>
             </a:fld>
             <a:endParaRPr lang="fr-CH"/>
           </a:p>
@@ -1999,7 +2023,7 @@
           <a:p>
             <a:fld id="{E5321D17-A8A2-4BD7-9C7D-8DAECA7660B1}" type="datetimeFigureOut">
               <a:rPr lang="fr-CH" smtClean="0"/>
-              <a:t>17.05.2024</a:t>
+              <a:t>30.05.2024</a:t>
             </a:fld>
             <a:endParaRPr lang="fr-CH"/>
           </a:p>
@@ -2112,7 +2136,7 @@
           <a:p>
             <a:fld id="{E5321D17-A8A2-4BD7-9C7D-8DAECA7660B1}" type="datetimeFigureOut">
               <a:rPr lang="fr-CH" smtClean="0"/>
-              <a:t>17.05.2024</a:t>
+              <a:t>30.05.2024</a:t>
             </a:fld>
             <a:endParaRPr lang="fr-CH"/>
           </a:p>
@@ -2425,7 +2449,7 @@
           <a:p>
             <a:fld id="{E5321D17-A8A2-4BD7-9C7D-8DAECA7660B1}" type="datetimeFigureOut">
               <a:rPr lang="fr-CH" smtClean="0"/>
-              <a:t>17.05.2024</a:t>
+              <a:t>30.05.2024</a:t>
             </a:fld>
             <a:endParaRPr lang="fr-CH"/>
           </a:p>
@@ -2714,7 +2738,7 @@
           <a:p>
             <a:fld id="{E5321D17-A8A2-4BD7-9C7D-8DAECA7660B1}" type="datetimeFigureOut">
               <a:rPr lang="fr-CH" smtClean="0"/>
-              <a:t>17.05.2024</a:t>
+              <a:t>30.05.2024</a:t>
             </a:fld>
             <a:endParaRPr lang="fr-CH"/>
           </a:p>
@@ -2957,7 +2981,7 @@
           <a:p>
             <a:fld id="{E5321D17-A8A2-4BD7-9C7D-8DAECA7660B1}" type="datetimeFigureOut">
               <a:rPr lang="fr-CH" smtClean="0"/>
-              <a:t>17.05.2024</a:t>
+              <a:t>30.05.2024</a:t>
             </a:fld>
             <a:endParaRPr lang="fr-CH"/>
           </a:p>
@@ -3376,10 +3400,10 @@
       </p:grpSpPr>
       <p:pic>
         <p:nvPicPr>
-          <p:cNvPr id="16" name="Image 15">
-            <a:extLst>
-              <a:ext uri="{FF2B5EF4-FFF2-40B4-BE49-F238E27FC236}">
-                <a16:creationId xmlns:a16="http://schemas.microsoft.com/office/drawing/2014/main" id="{C22C8D9B-A133-5013-5F07-36263206546A}"/>
+          <p:cNvPr id="3" name="Image 2">
+            <a:extLst>
+              <a:ext uri="{FF2B5EF4-FFF2-40B4-BE49-F238E27FC236}">
+                <a16:creationId xmlns:a16="http://schemas.microsoft.com/office/drawing/2014/main" id="{057F6A15-6687-EC94-853A-6DAA2C4EBDAE}"/>
               </a:ext>
             </a:extLst>
           </p:cNvPr>
@@ -3396,8 +3420,8 @@
         </p:blipFill>
         <p:spPr>
           <a:xfrm>
-            <a:off x="0" y="465259"/>
-            <a:ext cx="12192000" cy="6395790"/>
+            <a:off x="0" y="597158"/>
+            <a:ext cx="12192000" cy="6260841"/>
           </a:xfrm>
           <a:prstGeom prst="rect">
             <a:avLst/>
@@ -3477,8 +3501,8 @@
         </p:nvSpPr>
         <p:spPr>
           <a:xfrm>
-            <a:off x="574828" y="959667"/>
-            <a:ext cx="11042343" cy="5441476"/>
+            <a:off x="1073555" y="1093206"/>
+            <a:ext cx="10044887" cy="4671588"/>
           </a:xfrm>
           <a:prstGeom prst="rect">
             <a:avLst/>
@@ -3519,6 +3543,64 @@
               <a:t>MOT DE BIENVENUE</a:t>
             </a:r>
             <a:endParaRPr lang="fr-CH" dirty="0"/>
+          </a:p>
+        </p:txBody>
+      </p:sp>
+      <p:sp>
+        <p:nvSpPr>
+          <p:cNvPr id="5" name="Rectangle 4">
+            <a:extLst>
+              <a:ext uri="{FF2B5EF4-FFF2-40B4-BE49-F238E27FC236}">
+                <a16:creationId xmlns:a16="http://schemas.microsoft.com/office/drawing/2014/main" id="{6FDA09C2-0222-AE2C-5A5A-74C95405DAAF}"/>
+              </a:ext>
+            </a:extLst>
+          </p:cNvPr>
+          <p:cNvSpPr/>
+          <p:nvPr/>
+        </p:nvSpPr>
+        <p:spPr>
+          <a:xfrm>
+            <a:off x="-1" y="6260842"/>
+            <a:ext cx="12192000" cy="597159"/>
+          </a:xfrm>
+          <a:prstGeom prst="rect">
+            <a:avLst/>
+          </a:prstGeom>
+          <a:solidFill>
+            <a:schemeClr val="tx1">
+              <a:lumMod val="75000"/>
+              <a:lumOff val="25000"/>
+            </a:schemeClr>
+          </a:solidFill>
+          <a:ln>
+            <a:noFill/>
+          </a:ln>
+        </p:spPr>
+        <p:style>
+          <a:lnRef idx="2">
+            <a:schemeClr val="dk1">
+              <a:shade val="15000"/>
+            </a:schemeClr>
+          </a:lnRef>
+          <a:fillRef idx="1">
+            <a:schemeClr val="dk1"/>
+          </a:fillRef>
+          <a:effectRef idx="0">
+            <a:schemeClr val="dk1"/>
+          </a:effectRef>
+          <a:fontRef idx="minor">
+            <a:schemeClr val="lt1"/>
+          </a:fontRef>
+        </p:style>
+        <p:txBody>
+          <a:bodyPr rtlCol="0" anchor="ctr"/>
+          <a:lstStyle/>
+          <a:p>
+            <a:pPr algn="ctr"/>
+            <a:r>
+              <a:rPr lang="fr-FR" dirty="0"/>
+              <a:t>FOOTER</a:t>
+            </a:r>
           </a:p>
         </p:txBody>
       </p:sp>
@@ -3554,10 +3636,10 @@
       </p:grpSpPr>
       <p:pic>
         <p:nvPicPr>
-          <p:cNvPr id="16" name="Image 15">
-            <a:extLst>
-              <a:ext uri="{FF2B5EF4-FFF2-40B4-BE49-F238E27FC236}">
-                <a16:creationId xmlns:a16="http://schemas.microsoft.com/office/drawing/2014/main" id="{C22C8D9B-A133-5013-5F07-36263206546A}"/>
+          <p:cNvPr id="2" name="Image 1">
+            <a:extLst>
+              <a:ext uri="{FF2B5EF4-FFF2-40B4-BE49-F238E27FC236}">
+                <a16:creationId xmlns:a16="http://schemas.microsoft.com/office/drawing/2014/main" id="{69D22EF2-0003-5AA2-3D77-6C348406442E}"/>
               </a:ext>
             </a:extLst>
           </p:cNvPr>
@@ -3574,8 +3656,8 @@
         </p:blipFill>
         <p:spPr>
           <a:xfrm>
-            <a:off x="0" y="465259"/>
-            <a:ext cx="12192000" cy="6395790"/>
+            <a:off x="0" y="597158"/>
+            <a:ext cx="12192000" cy="6260841"/>
           </a:xfrm>
           <a:prstGeom prst="rect">
             <a:avLst/>
@@ -3905,6 +3987,64 @@
               <a:t>MOT DE BIENVENUE</a:t>
             </a:r>
             <a:endParaRPr lang="fr-CH" dirty="0"/>
+          </a:p>
+        </p:txBody>
+      </p:sp>
+      <p:sp>
+        <p:nvSpPr>
+          <p:cNvPr id="3" name="Rectangle 2">
+            <a:extLst>
+              <a:ext uri="{FF2B5EF4-FFF2-40B4-BE49-F238E27FC236}">
+                <a16:creationId xmlns:a16="http://schemas.microsoft.com/office/drawing/2014/main" id="{65D84CC7-01E7-E689-8E52-B99D7A9A91B7}"/>
+              </a:ext>
+            </a:extLst>
+          </p:cNvPr>
+          <p:cNvSpPr/>
+          <p:nvPr/>
+        </p:nvSpPr>
+        <p:spPr>
+          <a:xfrm>
+            <a:off x="-1" y="6260842"/>
+            <a:ext cx="12192000" cy="597159"/>
+          </a:xfrm>
+          <a:prstGeom prst="rect">
+            <a:avLst/>
+          </a:prstGeom>
+          <a:solidFill>
+            <a:schemeClr val="tx1">
+              <a:lumMod val="75000"/>
+              <a:lumOff val="25000"/>
+            </a:schemeClr>
+          </a:solidFill>
+          <a:ln>
+            <a:noFill/>
+          </a:ln>
+        </p:spPr>
+        <p:style>
+          <a:lnRef idx="2">
+            <a:schemeClr val="dk1">
+              <a:shade val="15000"/>
+            </a:schemeClr>
+          </a:lnRef>
+          <a:fillRef idx="1">
+            <a:schemeClr val="dk1"/>
+          </a:fillRef>
+          <a:effectRef idx="0">
+            <a:schemeClr val="dk1"/>
+          </a:effectRef>
+          <a:fontRef idx="minor">
+            <a:schemeClr val="lt1"/>
+          </a:fontRef>
+        </p:style>
+        <p:txBody>
+          <a:bodyPr rtlCol="0" anchor="ctr"/>
+          <a:lstStyle/>
+          <a:p>
+            <a:pPr algn="ctr"/>
+            <a:r>
+              <a:rPr lang="fr-FR" dirty="0"/>
+              <a:t>FOOTER</a:t>
+            </a:r>
           </a:p>
         </p:txBody>
       </p:sp>
@@ -3940,10 +4080,10 @@
       </p:grpSpPr>
       <p:pic>
         <p:nvPicPr>
-          <p:cNvPr id="16" name="Image 15">
-            <a:extLst>
-              <a:ext uri="{FF2B5EF4-FFF2-40B4-BE49-F238E27FC236}">
-                <a16:creationId xmlns:a16="http://schemas.microsoft.com/office/drawing/2014/main" id="{C22C8D9B-A133-5013-5F07-36263206546A}"/>
+          <p:cNvPr id="2" name="Image 1">
+            <a:extLst>
+              <a:ext uri="{FF2B5EF4-FFF2-40B4-BE49-F238E27FC236}">
+                <a16:creationId xmlns:a16="http://schemas.microsoft.com/office/drawing/2014/main" id="{69065795-1527-6370-21FB-8CF9F6A91109}"/>
               </a:ext>
             </a:extLst>
           </p:cNvPr>
@@ -3960,8 +4100,8 @@
         </p:blipFill>
         <p:spPr>
           <a:xfrm>
-            <a:off x="0" y="465259"/>
-            <a:ext cx="12192000" cy="6395790"/>
+            <a:off x="0" y="597158"/>
+            <a:ext cx="12192000" cy="6260841"/>
           </a:xfrm>
           <a:prstGeom prst="rect">
             <a:avLst/>
@@ -4041,8 +4181,8 @@
         </p:nvSpPr>
         <p:spPr>
           <a:xfrm>
-            <a:off x="574828" y="2082297"/>
-            <a:ext cx="11042343" cy="4318846"/>
+            <a:off x="1127876" y="2330458"/>
+            <a:ext cx="9936245" cy="3554294"/>
           </a:xfrm>
           <a:prstGeom prst="rect">
             <a:avLst/>
@@ -4103,8 +4243,180 @@
         </p:nvSpPr>
         <p:spPr>
           <a:xfrm>
-            <a:off x="7460055" y="757238"/>
-            <a:ext cx="4579829" cy="1164978"/>
+            <a:off x="3806082" y="894963"/>
+            <a:ext cx="4579829" cy="410659"/>
+          </a:xfrm>
+          <a:prstGeom prst="rect">
+            <a:avLst/>
+          </a:prstGeom>
+          <a:solidFill>
+            <a:schemeClr val="bg2">
+              <a:lumMod val="90000"/>
+            </a:schemeClr>
+          </a:solidFill>
+          <a:ln>
+            <a:noFill/>
+          </a:ln>
+        </p:spPr>
+        <p:style>
+          <a:lnRef idx="2">
+            <a:schemeClr val="dk1">
+              <a:shade val="15000"/>
+            </a:schemeClr>
+          </a:lnRef>
+          <a:fillRef idx="1">
+            <a:schemeClr val="dk1"/>
+          </a:fillRef>
+          <a:effectRef idx="0">
+            <a:schemeClr val="dk1"/>
+          </a:effectRef>
+          <a:fontRef idx="minor">
+            <a:schemeClr val="lt1"/>
+          </a:fontRef>
+        </p:style>
+        <p:txBody>
+          <a:bodyPr rtlCol="0" anchor="ctr"/>
+          <a:lstStyle/>
+          <a:p>
+            <a:pPr algn="ctr"/>
+            <a:r>
+              <a:rPr lang="fr-CH" sz="1400" dirty="0"/>
+              <a:t>Filtres de recherche</a:t>
+            </a:r>
+          </a:p>
+        </p:txBody>
+      </p:sp>
+      <p:sp>
+        <p:nvSpPr>
+          <p:cNvPr id="3" name="Rectangle 2">
+            <a:extLst>
+              <a:ext uri="{FF2B5EF4-FFF2-40B4-BE49-F238E27FC236}">
+                <a16:creationId xmlns:a16="http://schemas.microsoft.com/office/drawing/2014/main" id="{9B1D8891-FAE8-AB35-83D4-DA1C6A388C9A}"/>
+              </a:ext>
+            </a:extLst>
+          </p:cNvPr>
+          <p:cNvSpPr/>
+          <p:nvPr/>
+        </p:nvSpPr>
+        <p:spPr>
+          <a:xfrm>
+            <a:off x="-1" y="6260842"/>
+            <a:ext cx="12192000" cy="597159"/>
+          </a:xfrm>
+          <a:prstGeom prst="rect">
+            <a:avLst/>
+          </a:prstGeom>
+          <a:solidFill>
+            <a:schemeClr val="tx1">
+              <a:lumMod val="75000"/>
+              <a:lumOff val="25000"/>
+            </a:schemeClr>
+          </a:solidFill>
+          <a:ln>
+            <a:noFill/>
+          </a:ln>
+        </p:spPr>
+        <p:style>
+          <a:lnRef idx="2">
+            <a:schemeClr val="dk1">
+              <a:shade val="15000"/>
+            </a:schemeClr>
+          </a:lnRef>
+          <a:fillRef idx="1">
+            <a:schemeClr val="dk1"/>
+          </a:fillRef>
+          <a:effectRef idx="0">
+            <a:schemeClr val="dk1"/>
+          </a:effectRef>
+          <a:fontRef idx="minor">
+            <a:schemeClr val="lt1"/>
+          </a:fontRef>
+        </p:style>
+        <p:txBody>
+          <a:bodyPr rtlCol="0" anchor="ctr"/>
+          <a:lstStyle/>
+          <a:p>
+            <a:pPr algn="ctr"/>
+            <a:r>
+              <a:rPr lang="fr-FR" dirty="0"/>
+              <a:t>FOOTER</a:t>
+            </a:r>
+          </a:p>
+        </p:txBody>
+      </p:sp>
+      <p:sp>
+        <p:nvSpPr>
+          <p:cNvPr id="5" name="Rectangle 4">
+            <a:extLst>
+              <a:ext uri="{FF2B5EF4-FFF2-40B4-BE49-F238E27FC236}">
+                <a16:creationId xmlns:a16="http://schemas.microsoft.com/office/drawing/2014/main" id="{37DD7363-3B92-4851-5755-E635F5CA5429}"/>
+              </a:ext>
+            </a:extLst>
+          </p:cNvPr>
+          <p:cNvSpPr/>
+          <p:nvPr/>
+        </p:nvSpPr>
+        <p:spPr>
+          <a:xfrm>
+            <a:off x="1516168" y="1511557"/>
+            <a:ext cx="4579829" cy="410659"/>
+          </a:xfrm>
+          <a:prstGeom prst="rect">
+            <a:avLst/>
+          </a:prstGeom>
+          <a:solidFill>
+            <a:schemeClr val="bg2">
+              <a:lumMod val="90000"/>
+            </a:schemeClr>
+          </a:solidFill>
+          <a:ln>
+            <a:noFill/>
+          </a:ln>
+        </p:spPr>
+        <p:style>
+          <a:lnRef idx="2">
+            <a:schemeClr val="dk1">
+              <a:shade val="15000"/>
+            </a:schemeClr>
+          </a:lnRef>
+          <a:fillRef idx="1">
+            <a:schemeClr val="dk1"/>
+          </a:fillRef>
+          <a:effectRef idx="0">
+            <a:schemeClr val="dk1"/>
+          </a:effectRef>
+          <a:fontRef idx="minor">
+            <a:schemeClr val="lt1"/>
+          </a:fontRef>
+        </p:style>
+        <p:txBody>
+          <a:bodyPr rtlCol="0" anchor="ctr"/>
+          <a:lstStyle/>
+          <a:p>
+            <a:pPr algn="ctr"/>
+            <a:r>
+              <a:rPr lang="fr-CH" sz="1400" dirty="0"/>
+              <a:t>Filtres de recherche</a:t>
+            </a:r>
+          </a:p>
+        </p:txBody>
+      </p:sp>
+      <p:sp>
+        <p:nvSpPr>
+          <p:cNvPr id="6" name="Rectangle 5">
+            <a:extLst>
+              <a:ext uri="{FF2B5EF4-FFF2-40B4-BE49-F238E27FC236}">
+                <a16:creationId xmlns:a16="http://schemas.microsoft.com/office/drawing/2014/main" id="{545A5D11-177E-229F-3ED3-29FD8A2CB51C}"/>
+              </a:ext>
+            </a:extLst>
+          </p:cNvPr>
+          <p:cNvSpPr/>
+          <p:nvPr/>
+        </p:nvSpPr>
+        <p:spPr>
+          <a:xfrm>
+            <a:off x="6167529" y="1510348"/>
+            <a:ext cx="4579829" cy="410659"/>
           </a:xfrm>
           <a:prstGeom prst="rect">
             <a:avLst/>
@@ -4178,10 +4490,10 @@
       </p:grpSpPr>
       <p:pic>
         <p:nvPicPr>
-          <p:cNvPr id="16" name="Image 15">
-            <a:extLst>
-              <a:ext uri="{FF2B5EF4-FFF2-40B4-BE49-F238E27FC236}">
-                <a16:creationId xmlns:a16="http://schemas.microsoft.com/office/drawing/2014/main" id="{C22C8D9B-A133-5013-5F07-36263206546A}"/>
+          <p:cNvPr id="15" name="Image 14">
+            <a:extLst>
+              <a:ext uri="{FF2B5EF4-FFF2-40B4-BE49-F238E27FC236}">
+                <a16:creationId xmlns:a16="http://schemas.microsoft.com/office/drawing/2014/main" id="{174DEEE5-9D39-B989-2155-F20A89E06DDE}"/>
               </a:ext>
             </a:extLst>
           </p:cNvPr>
@@ -4198,8 +4510,8 @@
         </p:blipFill>
         <p:spPr>
           <a:xfrm>
-            <a:off x="0" y="465259"/>
-            <a:ext cx="12192000" cy="6395790"/>
+            <a:off x="0" y="597158"/>
+            <a:ext cx="12192000" cy="6260841"/>
           </a:xfrm>
           <a:prstGeom prst="rect">
             <a:avLst/>
@@ -4778,8 +5090,8 @@
         </p:nvSpPr>
         <p:spPr>
           <a:xfrm>
-            <a:off x="10280342" y="687384"/>
-            <a:ext cx="1859130" cy="356346"/>
+            <a:off x="3652449" y="919320"/>
+            <a:ext cx="4546773" cy="448713"/>
           </a:xfrm>
           <a:prstGeom prst="rect">
             <a:avLst/>
@@ -4835,8 +5147,8 @@
         </p:nvSpPr>
         <p:spPr>
           <a:xfrm>
-            <a:off x="10280342" y="1120284"/>
-            <a:ext cx="1859130" cy="356346"/>
+            <a:off x="2314728" y="1564392"/>
+            <a:ext cx="3611108" cy="356346"/>
           </a:xfrm>
           <a:prstGeom prst="rect">
             <a:avLst/>
@@ -4892,8 +5204,8 @@
         </p:nvSpPr>
         <p:spPr>
           <a:xfrm>
-            <a:off x="10280342" y="1557847"/>
-            <a:ext cx="1859130" cy="356346"/>
+            <a:off x="6096000" y="1569847"/>
+            <a:ext cx="3674541" cy="350159"/>
           </a:xfrm>
           <a:prstGeom prst="rect">
             <a:avLst/>
@@ -4939,6 +5251,1821 @@
     <p:extLst>
       <p:ext uri="{BB962C8B-B14F-4D97-AF65-F5344CB8AC3E}">
         <p14:creationId xmlns:p14="http://schemas.microsoft.com/office/powerpoint/2010/main" val="1862207691"/>
+      </p:ext>
+    </p:extLst>
+  </p:cSld>
+  <p:clrMapOvr>
+    <a:masterClrMapping/>
+  </p:clrMapOvr>
+</p:sld>
+</file>
+
+<file path=ppt/slides/slide5.xml><?xml version="1.0" encoding="utf-8"?>
+<p:sld xmlns:a="http://schemas.openxmlformats.org/drawingml/2006/main" xmlns:r="http://schemas.openxmlformats.org/officeDocument/2006/relationships" xmlns:p="http://schemas.openxmlformats.org/presentationml/2006/main">
+  <p:cSld>
+    <p:spTree>
+      <p:nvGrpSpPr>
+        <p:cNvPr id="1" name=""/>
+        <p:cNvGrpSpPr/>
+        <p:nvPr/>
+      </p:nvGrpSpPr>
+      <p:grpSpPr>
+        <a:xfrm>
+          <a:off x="0" y="0"/>
+          <a:ext cx="0" cy="0"/>
+          <a:chOff x="0" y="0"/>
+          <a:chExt cx="0" cy="0"/>
+        </a:xfrm>
+      </p:grpSpPr>
+      <p:pic>
+        <p:nvPicPr>
+          <p:cNvPr id="3" name="Image 2">
+            <a:extLst>
+              <a:ext uri="{FF2B5EF4-FFF2-40B4-BE49-F238E27FC236}">
+                <a16:creationId xmlns:a16="http://schemas.microsoft.com/office/drawing/2014/main" id="{057F6A15-6687-EC94-853A-6DAA2C4EBDAE}"/>
+              </a:ext>
+            </a:extLst>
+          </p:cNvPr>
+          <p:cNvPicPr>
+            <a:picLocks noChangeAspect="1"/>
+          </p:cNvPicPr>
+          <p:nvPr/>
+        </p:nvPicPr>
+        <p:blipFill>
+          <a:blip r:embed="rId2"/>
+          <a:stretch>
+            <a:fillRect/>
+          </a:stretch>
+        </p:blipFill>
+        <p:spPr>
+          <a:xfrm>
+            <a:off x="0" y="597158"/>
+            <a:ext cx="12192000" cy="6260841"/>
+          </a:xfrm>
+          <a:prstGeom prst="rect">
+            <a:avLst/>
+          </a:prstGeom>
+        </p:spPr>
+      </p:pic>
+      <p:sp>
+        <p:nvSpPr>
+          <p:cNvPr id="4" name="Rectangle 3">
+            <a:extLst>
+              <a:ext uri="{FF2B5EF4-FFF2-40B4-BE49-F238E27FC236}">
+                <a16:creationId xmlns:a16="http://schemas.microsoft.com/office/drawing/2014/main" id="{671DC950-7CED-0154-51FD-C1606DEC1DCF}"/>
+              </a:ext>
+            </a:extLst>
+          </p:cNvPr>
+          <p:cNvSpPr/>
+          <p:nvPr/>
+        </p:nvSpPr>
+        <p:spPr>
+          <a:xfrm>
+            <a:off x="0" y="0"/>
+            <a:ext cx="12192000" cy="597159"/>
+          </a:xfrm>
+          <a:prstGeom prst="rect">
+            <a:avLst/>
+          </a:prstGeom>
+          <a:solidFill>
+            <a:schemeClr val="tx1">
+              <a:lumMod val="75000"/>
+              <a:lumOff val="25000"/>
+            </a:schemeClr>
+          </a:solidFill>
+          <a:ln>
+            <a:noFill/>
+          </a:ln>
+        </p:spPr>
+        <p:style>
+          <a:lnRef idx="2">
+            <a:schemeClr val="dk1">
+              <a:shade val="15000"/>
+            </a:schemeClr>
+          </a:lnRef>
+          <a:fillRef idx="1">
+            <a:schemeClr val="dk1"/>
+          </a:fillRef>
+          <a:effectRef idx="0">
+            <a:schemeClr val="dk1"/>
+          </a:effectRef>
+          <a:fontRef idx="minor">
+            <a:schemeClr val="lt1"/>
+          </a:fontRef>
+        </p:style>
+        <p:txBody>
+          <a:bodyPr rtlCol="0" anchor="ctr"/>
+          <a:lstStyle/>
+          <a:p>
+            <a:pPr algn="ctr"/>
+            <a:r>
+              <a:rPr lang="fr-FR" dirty="0"/>
+              <a:t>BARRE DE NAVIGATION</a:t>
+            </a:r>
+            <a:endParaRPr lang="fr-CH" dirty="0"/>
+          </a:p>
+        </p:txBody>
+      </p:sp>
+      <p:sp>
+        <p:nvSpPr>
+          <p:cNvPr id="5" name="Rectangle 4">
+            <a:extLst>
+              <a:ext uri="{FF2B5EF4-FFF2-40B4-BE49-F238E27FC236}">
+                <a16:creationId xmlns:a16="http://schemas.microsoft.com/office/drawing/2014/main" id="{6FDA09C2-0222-AE2C-5A5A-74C95405DAAF}"/>
+              </a:ext>
+            </a:extLst>
+          </p:cNvPr>
+          <p:cNvSpPr/>
+          <p:nvPr/>
+        </p:nvSpPr>
+        <p:spPr>
+          <a:xfrm>
+            <a:off x="-1" y="6260842"/>
+            <a:ext cx="12192000" cy="597159"/>
+          </a:xfrm>
+          <a:prstGeom prst="rect">
+            <a:avLst/>
+          </a:prstGeom>
+          <a:solidFill>
+            <a:schemeClr val="tx1">
+              <a:lumMod val="75000"/>
+              <a:lumOff val="25000"/>
+            </a:schemeClr>
+          </a:solidFill>
+          <a:ln>
+            <a:noFill/>
+          </a:ln>
+        </p:spPr>
+        <p:style>
+          <a:lnRef idx="2">
+            <a:schemeClr val="dk1">
+              <a:shade val="15000"/>
+            </a:schemeClr>
+          </a:lnRef>
+          <a:fillRef idx="1">
+            <a:schemeClr val="dk1"/>
+          </a:fillRef>
+          <a:effectRef idx="0">
+            <a:schemeClr val="dk1"/>
+          </a:effectRef>
+          <a:fontRef idx="minor">
+            <a:schemeClr val="lt1"/>
+          </a:fontRef>
+        </p:style>
+        <p:txBody>
+          <a:bodyPr rtlCol="0" anchor="ctr"/>
+          <a:lstStyle/>
+          <a:p>
+            <a:pPr algn="ctr"/>
+            <a:r>
+              <a:rPr lang="fr-FR" dirty="0"/>
+              <a:t>FOOTER</a:t>
+            </a:r>
+          </a:p>
+        </p:txBody>
+      </p:sp>
+      <p:sp>
+        <p:nvSpPr>
+          <p:cNvPr id="6" name="Rectangle : coins arrondis 5">
+            <a:extLst>
+              <a:ext uri="{FF2B5EF4-FFF2-40B4-BE49-F238E27FC236}">
+                <a16:creationId xmlns:a16="http://schemas.microsoft.com/office/drawing/2014/main" id="{2585C42F-90C8-470A-D13C-9674026A2B84}"/>
+              </a:ext>
+            </a:extLst>
+          </p:cNvPr>
+          <p:cNvSpPr/>
+          <p:nvPr/>
+        </p:nvSpPr>
+        <p:spPr>
+          <a:xfrm>
+            <a:off x="3094775" y="1378391"/>
+            <a:ext cx="6002447" cy="4101219"/>
+          </a:xfrm>
+          <a:prstGeom prst="roundRect">
+            <a:avLst/>
+          </a:prstGeom>
+          <a:solidFill>
+            <a:schemeClr val="bg1"/>
+          </a:solidFill>
+        </p:spPr>
+        <p:style>
+          <a:lnRef idx="2">
+            <a:schemeClr val="accent1">
+              <a:shade val="15000"/>
+            </a:schemeClr>
+          </a:lnRef>
+          <a:fillRef idx="1">
+            <a:schemeClr val="accent1"/>
+          </a:fillRef>
+          <a:effectRef idx="0">
+            <a:schemeClr val="accent1"/>
+          </a:effectRef>
+          <a:fontRef idx="minor">
+            <a:schemeClr val="lt1"/>
+          </a:fontRef>
+        </p:style>
+        <p:txBody>
+          <a:bodyPr rtlCol="0" anchor="ctr"/>
+          <a:lstStyle/>
+          <a:p>
+            <a:pPr algn="ctr"/>
+            <a:r>
+              <a:rPr lang="fr-FR" dirty="0">
+                <a:solidFill>
+                  <a:schemeClr val="tx1"/>
+                </a:solidFill>
+              </a:rPr>
+              <a:t>CHOIX COMPTE</a:t>
+            </a:r>
+            <a:endParaRPr lang="fr-CH" dirty="0">
+              <a:solidFill>
+                <a:schemeClr val="tx1"/>
+              </a:solidFill>
+            </a:endParaRPr>
+          </a:p>
+        </p:txBody>
+      </p:sp>
+    </p:spTree>
+    <p:extLst>
+      <p:ext uri="{BB962C8B-B14F-4D97-AF65-F5344CB8AC3E}">
+        <p14:creationId xmlns:p14="http://schemas.microsoft.com/office/powerpoint/2010/main" val="2746787710"/>
+      </p:ext>
+    </p:extLst>
+  </p:cSld>
+  <p:clrMapOvr>
+    <a:masterClrMapping/>
+  </p:clrMapOvr>
+</p:sld>
+</file>
+
+<file path=ppt/slides/slide6.xml><?xml version="1.0" encoding="utf-8"?>
+<p:sld xmlns:a="http://schemas.openxmlformats.org/drawingml/2006/main" xmlns:r="http://schemas.openxmlformats.org/officeDocument/2006/relationships" xmlns:p="http://schemas.openxmlformats.org/presentationml/2006/main">
+  <p:cSld>
+    <p:spTree>
+      <p:nvGrpSpPr>
+        <p:cNvPr id="1" name=""/>
+        <p:cNvGrpSpPr/>
+        <p:nvPr/>
+      </p:nvGrpSpPr>
+      <p:grpSpPr>
+        <a:xfrm>
+          <a:off x="0" y="0"/>
+          <a:ext cx="0" cy="0"/>
+          <a:chOff x="0" y="0"/>
+          <a:chExt cx="0" cy="0"/>
+        </a:xfrm>
+      </p:grpSpPr>
+      <p:pic>
+        <p:nvPicPr>
+          <p:cNvPr id="3" name="Image 2">
+            <a:extLst>
+              <a:ext uri="{FF2B5EF4-FFF2-40B4-BE49-F238E27FC236}">
+                <a16:creationId xmlns:a16="http://schemas.microsoft.com/office/drawing/2014/main" id="{057F6A15-6687-EC94-853A-6DAA2C4EBDAE}"/>
+              </a:ext>
+            </a:extLst>
+          </p:cNvPr>
+          <p:cNvPicPr>
+            <a:picLocks noChangeAspect="1"/>
+          </p:cNvPicPr>
+          <p:nvPr/>
+        </p:nvPicPr>
+        <p:blipFill>
+          <a:blip r:embed="rId2"/>
+          <a:stretch>
+            <a:fillRect/>
+          </a:stretch>
+        </p:blipFill>
+        <p:spPr>
+          <a:xfrm>
+            <a:off x="0" y="597158"/>
+            <a:ext cx="12192000" cy="6260841"/>
+          </a:xfrm>
+          <a:prstGeom prst="rect">
+            <a:avLst/>
+          </a:prstGeom>
+        </p:spPr>
+      </p:pic>
+      <p:sp>
+        <p:nvSpPr>
+          <p:cNvPr id="4" name="Rectangle 3">
+            <a:extLst>
+              <a:ext uri="{FF2B5EF4-FFF2-40B4-BE49-F238E27FC236}">
+                <a16:creationId xmlns:a16="http://schemas.microsoft.com/office/drawing/2014/main" id="{671DC950-7CED-0154-51FD-C1606DEC1DCF}"/>
+              </a:ext>
+            </a:extLst>
+          </p:cNvPr>
+          <p:cNvSpPr/>
+          <p:nvPr/>
+        </p:nvSpPr>
+        <p:spPr>
+          <a:xfrm>
+            <a:off x="0" y="0"/>
+            <a:ext cx="12192000" cy="597159"/>
+          </a:xfrm>
+          <a:prstGeom prst="rect">
+            <a:avLst/>
+          </a:prstGeom>
+          <a:solidFill>
+            <a:schemeClr val="tx1">
+              <a:lumMod val="75000"/>
+              <a:lumOff val="25000"/>
+            </a:schemeClr>
+          </a:solidFill>
+          <a:ln>
+            <a:noFill/>
+          </a:ln>
+        </p:spPr>
+        <p:style>
+          <a:lnRef idx="2">
+            <a:schemeClr val="dk1">
+              <a:shade val="15000"/>
+            </a:schemeClr>
+          </a:lnRef>
+          <a:fillRef idx="1">
+            <a:schemeClr val="dk1"/>
+          </a:fillRef>
+          <a:effectRef idx="0">
+            <a:schemeClr val="dk1"/>
+          </a:effectRef>
+          <a:fontRef idx="minor">
+            <a:schemeClr val="lt1"/>
+          </a:fontRef>
+        </p:style>
+        <p:txBody>
+          <a:bodyPr rtlCol="0" anchor="ctr"/>
+          <a:lstStyle/>
+          <a:p>
+            <a:pPr algn="ctr"/>
+            <a:r>
+              <a:rPr lang="fr-FR" dirty="0"/>
+              <a:t>BARRE DE NAVIGATION</a:t>
+            </a:r>
+            <a:endParaRPr lang="fr-CH" dirty="0"/>
+          </a:p>
+        </p:txBody>
+      </p:sp>
+      <p:sp>
+        <p:nvSpPr>
+          <p:cNvPr id="5" name="Rectangle 4">
+            <a:extLst>
+              <a:ext uri="{FF2B5EF4-FFF2-40B4-BE49-F238E27FC236}">
+                <a16:creationId xmlns:a16="http://schemas.microsoft.com/office/drawing/2014/main" id="{6FDA09C2-0222-AE2C-5A5A-74C95405DAAF}"/>
+              </a:ext>
+            </a:extLst>
+          </p:cNvPr>
+          <p:cNvSpPr/>
+          <p:nvPr/>
+        </p:nvSpPr>
+        <p:spPr>
+          <a:xfrm>
+            <a:off x="-1" y="6260842"/>
+            <a:ext cx="12192000" cy="597159"/>
+          </a:xfrm>
+          <a:prstGeom prst="rect">
+            <a:avLst/>
+          </a:prstGeom>
+          <a:solidFill>
+            <a:schemeClr val="tx1">
+              <a:lumMod val="75000"/>
+              <a:lumOff val="25000"/>
+            </a:schemeClr>
+          </a:solidFill>
+          <a:ln>
+            <a:noFill/>
+          </a:ln>
+        </p:spPr>
+        <p:style>
+          <a:lnRef idx="2">
+            <a:schemeClr val="dk1">
+              <a:shade val="15000"/>
+            </a:schemeClr>
+          </a:lnRef>
+          <a:fillRef idx="1">
+            <a:schemeClr val="dk1"/>
+          </a:fillRef>
+          <a:effectRef idx="0">
+            <a:schemeClr val="dk1"/>
+          </a:effectRef>
+          <a:fontRef idx="minor">
+            <a:schemeClr val="lt1"/>
+          </a:fontRef>
+        </p:style>
+        <p:txBody>
+          <a:bodyPr rtlCol="0" anchor="ctr"/>
+          <a:lstStyle/>
+          <a:p>
+            <a:pPr algn="ctr"/>
+            <a:r>
+              <a:rPr lang="fr-FR" dirty="0"/>
+              <a:t>FOOTER</a:t>
+            </a:r>
+          </a:p>
+        </p:txBody>
+      </p:sp>
+      <p:sp>
+        <p:nvSpPr>
+          <p:cNvPr id="6" name="Rectangle : coins arrondis 5">
+            <a:extLst>
+              <a:ext uri="{FF2B5EF4-FFF2-40B4-BE49-F238E27FC236}">
+                <a16:creationId xmlns:a16="http://schemas.microsoft.com/office/drawing/2014/main" id="{2585C42F-90C8-470A-D13C-9674026A2B84}"/>
+              </a:ext>
+            </a:extLst>
+          </p:cNvPr>
+          <p:cNvSpPr/>
+          <p:nvPr/>
+        </p:nvSpPr>
+        <p:spPr>
+          <a:xfrm>
+            <a:off x="3094775" y="1378391"/>
+            <a:ext cx="6002447" cy="4101219"/>
+          </a:xfrm>
+          <a:prstGeom prst="roundRect">
+            <a:avLst/>
+          </a:prstGeom>
+          <a:solidFill>
+            <a:schemeClr val="bg1"/>
+          </a:solidFill>
+        </p:spPr>
+        <p:style>
+          <a:lnRef idx="2">
+            <a:schemeClr val="accent1">
+              <a:shade val="15000"/>
+            </a:schemeClr>
+          </a:lnRef>
+          <a:fillRef idx="1">
+            <a:schemeClr val="accent1"/>
+          </a:fillRef>
+          <a:effectRef idx="0">
+            <a:schemeClr val="accent1"/>
+          </a:effectRef>
+          <a:fontRef idx="minor">
+            <a:schemeClr val="lt1"/>
+          </a:fontRef>
+        </p:style>
+        <p:txBody>
+          <a:bodyPr rtlCol="0" anchor="ctr"/>
+          <a:lstStyle/>
+          <a:p>
+            <a:pPr algn="ctr"/>
+            <a:endParaRPr lang="fr-CH" dirty="0">
+              <a:solidFill>
+                <a:schemeClr val="tx1"/>
+              </a:solidFill>
+            </a:endParaRPr>
+          </a:p>
+        </p:txBody>
+      </p:sp>
+      <p:sp>
+        <p:nvSpPr>
+          <p:cNvPr id="7" name="Rectangle 6">
+            <a:extLst>
+              <a:ext uri="{FF2B5EF4-FFF2-40B4-BE49-F238E27FC236}">
+                <a16:creationId xmlns:a16="http://schemas.microsoft.com/office/drawing/2014/main" id="{B4F52125-2EE0-4F22-9403-A190B9F360A7}"/>
+              </a:ext>
+            </a:extLst>
+          </p:cNvPr>
+          <p:cNvSpPr/>
+          <p:nvPr/>
+        </p:nvSpPr>
+        <p:spPr>
+          <a:xfrm>
+            <a:off x="0" y="0"/>
+            <a:ext cx="12192000" cy="597159"/>
+          </a:xfrm>
+          <a:prstGeom prst="rect">
+            <a:avLst/>
+          </a:prstGeom>
+          <a:solidFill>
+            <a:schemeClr val="tx1">
+              <a:lumMod val="75000"/>
+              <a:lumOff val="25000"/>
+            </a:schemeClr>
+          </a:solidFill>
+          <a:ln>
+            <a:noFill/>
+          </a:ln>
+        </p:spPr>
+        <p:style>
+          <a:lnRef idx="2">
+            <a:schemeClr val="dk1">
+              <a:shade val="15000"/>
+            </a:schemeClr>
+          </a:lnRef>
+          <a:fillRef idx="1">
+            <a:schemeClr val="dk1"/>
+          </a:fillRef>
+          <a:effectRef idx="0">
+            <a:schemeClr val="dk1"/>
+          </a:effectRef>
+          <a:fontRef idx="minor">
+            <a:schemeClr val="lt1"/>
+          </a:fontRef>
+        </p:style>
+        <p:txBody>
+          <a:bodyPr rtlCol="0" anchor="ctr"/>
+          <a:lstStyle/>
+          <a:p>
+            <a:pPr algn="ctr"/>
+            <a:endParaRPr lang="fr-CH"/>
+          </a:p>
+        </p:txBody>
+      </p:sp>
+      <p:sp>
+        <p:nvSpPr>
+          <p:cNvPr id="8" name="ZoneTexte 7">
+            <a:extLst>
+              <a:ext uri="{FF2B5EF4-FFF2-40B4-BE49-F238E27FC236}">
+                <a16:creationId xmlns:a16="http://schemas.microsoft.com/office/drawing/2014/main" id="{4CE4C5BB-6353-849E-3FAC-B103B4E94072}"/>
+              </a:ext>
+            </a:extLst>
+          </p:cNvPr>
+          <p:cNvSpPr txBox="1"/>
+          <p:nvPr/>
+        </p:nvSpPr>
+        <p:spPr>
+          <a:xfrm>
+            <a:off x="9268287" y="160079"/>
+            <a:ext cx="692460" cy="276999"/>
+          </a:xfrm>
+          <a:prstGeom prst="rect">
+            <a:avLst/>
+          </a:prstGeom>
+          <a:noFill/>
+        </p:spPr>
+        <p:txBody>
+          <a:bodyPr wrap="square" rtlCol="0">
+            <a:spAutoFit/>
+          </a:bodyPr>
+          <a:lstStyle/>
+          <a:p>
+            <a:r>
+              <a:rPr lang="fr-CH" sz="1200" dirty="0" err="1">
+                <a:solidFill>
+                  <a:schemeClr val="bg1"/>
+                </a:solidFill>
+              </a:rPr>
+              <a:t>Acceuil</a:t>
+            </a:r>
+            <a:endParaRPr lang="fr-CH" sz="1200" dirty="0">
+              <a:solidFill>
+                <a:schemeClr val="bg1"/>
+              </a:solidFill>
+            </a:endParaRPr>
+          </a:p>
+        </p:txBody>
+      </p:sp>
+      <p:sp>
+        <p:nvSpPr>
+          <p:cNvPr id="9" name="ZoneTexte 8">
+            <a:extLst>
+              <a:ext uri="{FF2B5EF4-FFF2-40B4-BE49-F238E27FC236}">
+                <a16:creationId xmlns:a16="http://schemas.microsoft.com/office/drawing/2014/main" id="{23A51A46-A528-2CF3-F756-2C2CAFD486D5}"/>
+              </a:ext>
+            </a:extLst>
+          </p:cNvPr>
+          <p:cNvSpPr txBox="1"/>
+          <p:nvPr/>
+        </p:nvSpPr>
+        <p:spPr>
+          <a:xfrm>
+            <a:off x="10062093" y="160360"/>
+            <a:ext cx="587404" cy="276999"/>
+          </a:xfrm>
+          <a:prstGeom prst="rect">
+            <a:avLst/>
+          </a:prstGeom>
+          <a:noFill/>
+        </p:spPr>
+        <p:txBody>
+          <a:bodyPr wrap="square" rtlCol="0">
+            <a:spAutoFit/>
+          </a:bodyPr>
+          <a:lstStyle/>
+          <a:p>
+            <a:r>
+              <a:rPr lang="fr-CH" sz="1200" dirty="0">
+                <a:solidFill>
+                  <a:schemeClr val="bg1"/>
+                </a:solidFill>
+              </a:rPr>
+              <a:t>Lots</a:t>
+            </a:r>
+          </a:p>
+        </p:txBody>
+      </p:sp>
+      <p:sp>
+        <p:nvSpPr>
+          <p:cNvPr id="10" name="ZoneTexte 9">
+            <a:extLst>
+              <a:ext uri="{FF2B5EF4-FFF2-40B4-BE49-F238E27FC236}">
+                <a16:creationId xmlns:a16="http://schemas.microsoft.com/office/drawing/2014/main" id="{901053F5-18A6-3984-E421-38A2E95BDFB8}"/>
+              </a:ext>
+            </a:extLst>
+          </p:cNvPr>
+          <p:cNvSpPr txBox="1"/>
+          <p:nvPr/>
+        </p:nvSpPr>
+        <p:spPr>
+          <a:xfrm>
+            <a:off x="10621012" y="160079"/>
+            <a:ext cx="797515" cy="276999"/>
+          </a:xfrm>
+          <a:prstGeom prst="rect">
+            <a:avLst/>
+          </a:prstGeom>
+          <a:noFill/>
+        </p:spPr>
+        <p:txBody>
+          <a:bodyPr wrap="square" rtlCol="0">
+            <a:spAutoFit/>
+          </a:bodyPr>
+          <a:lstStyle/>
+          <a:p>
+            <a:r>
+              <a:rPr lang="fr-CH" sz="1200" dirty="0">
+                <a:solidFill>
+                  <a:schemeClr val="bg1"/>
+                </a:solidFill>
+              </a:rPr>
+              <a:t>A</a:t>
+            </a:r>
+            <a:r>
+              <a:rPr lang="fr-CH" sz="1200" dirty="0"/>
+              <a:t> </a:t>
+            </a:r>
+            <a:r>
+              <a:rPr lang="fr-CH" sz="1200" dirty="0">
+                <a:solidFill>
+                  <a:schemeClr val="bg1"/>
+                </a:solidFill>
+              </a:rPr>
+              <a:t>propos</a:t>
+            </a:r>
+          </a:p>
+        </p:txBody>
+      </p:sp>
+      <p:sp>
+        <p:nvSpPr>
+          <p:cNvPr id="11" name="ZoneTexte 10">
+            <a:extLst>
+              <a:ext uri="{FF2B5EF4-FFF2-40B4-BE49-F238E27FC236}">
+                <a16:creationId xmlns:a16="http://schemas.microsoft.com/office/drawing/2014/main" id="{2AA5AA6A-5EC5-710F-DA30-0ADA6AD3D159}"/>
+              </a:ext>
+            </a:extLst>
+          </p:cNvPr>
+          <p:cNvSpPr txBox="1"/>
+          <p:nvPr/>
+        </p:nvSpPr>
+        <p:spPr>
+          <a:xfrm>
+            <a:off x="11447012" y="160079"/>
+            <a:ext cx="692460" cy="276999"/>
+          </a:xfrm>
+          <a:prstGeom prst="rect">
+            <a:avLst/>
+          </a:prstGeom>
+          <a:noFill/>
+        </p:spPr>
+        <p:txBody>
+          <a:bodyPr wrap="square" rtlCol="0">
+            <a:spAutoFit/>
+          </a:bodyPr>
+          <a:lstStyle/>
+          <a:p>
+            <a:r>
+              <a:rPr lang="fr-CH" sz="1200" dirty="0">
+                <a:solidFill>
+                  <a:schemeClr val="bg1"/>
+                </a:solidFill>
+              </a:rPr>
+              <a:t>Login</a:t>
+            </a:r>
+          </a:p>
+        </p:txBody>
+      </p:sp>
+      <p:sp>
+        <p:nvSpPr>
+          <p:cNvPr id="12" name="ZoneTexte 11">
+            <a:extLst>
+              <a:ext uri="{FF2B5EF4-FFF2-40B4-BE49-F238E27FC236}">
+                <a16:creationId xmlns:a16="http://schemas.microsoft.com/office/drawing/2014/main" id="{4717B9AA-8C8B-71AC-E5AF-E1B9EC13F52D}"/>
+              </a:ext>
+            </a:extLst>
+          </p:cNvPr>
+          <p:cNvSpPr txBox="1"/>
+          <p:nvPr/>
+        </p:nvSpPr>
+        <p:spPr>
+          <a:xfrm>
+            <a:off x="169417" y="142605"/>
+            <a:ext cx="1694894" cy="276999"/>
+          </a:xfrm>
+          <a:prstGeom prst="rect">
+            <a:avLst/>
+          </a:prstGeom>
+          <a:noFill/>
+        </p:spPr>
+        <p:txBody>
+          <a:bodyPr wrap="square" rtlCol="0">
+            <a:spAutoFit/>
+          </a:bodyPr>
+          <a:lstStyle/>
+          <a:p>
+            <a:r>
+              <a:rPr lang="fr-CH" sz="1200" dirty="0">
+                <a:solidFill>
+                  <a:schemeClr val="bg1"/>
+                </a:solidFill>
+              </a:rPr>
+              <a:t>(Logo) RIZCARDEAU</a:t>
+            </a:r>
+          </a:p>
+        </p:txBody>
+      </p:sp>
+      <p:pic>
+        <p:nvPicPr>
+          <p:cNvPr id="20" name="Graphique 19" descr="Homme avec un remplissage uni">
+            <a:extLst>
+              <a:ext uri="{FF2B5EF4-FFF2-40B4-BE49-F238E27FC236}">
+                <a16:creationId xmlns:a16="http://schemas.microsoft.com/office/drawing/2014/main" id="{0E40FAD9-E76E-5304-4108-52678C788628}"/>
+              </a:ext>
+            </a:extLst>
+          </p:cNvPr>
+          <p:cNvPicPr>
+            <a:picLocks noChangeAspect="1"/>
+          </p:cNvPicPr>
+          <p:nvPr/>
+        </p:nvPicPr>
+        <p:blipFill>
+          <a:blip r:embed="rId3">
+            <a:extLst>
+              <a:ext uri="{28A0092B-C50C-407E-A947-70E740481C1C}">
+                <a14:useLocalDpi xmlns:a14="http://schemas.microsoft.com/office/drawing/2010/main" val="0"/>
+              </a:ext>
+              <a:ext uri="{96DAC541-7B7A-43D3-8B79-37D633B846F1}">
+                <asvg:svgBlip xmlns:asvg="http://schemas.microsoft.com/office/drawing/2016/SVG/main" r:embed="rId4"/>
+              </a:ext>
+            </a:extLst>
+          </a:blip>
+          <a:stretch>
+            <a:fillRect/>
+          </a:stretch>
+        </p:blipFill>
+        <p:spPr>
+          <a:xfrm>
+            <a:off x="3846212" y="2510643"/>
+            <a:ext cx="1459117" cy="1459117"/>
+          </a:xfrm>
+          <a:prstGeom prst="rect">
+            <a:avLst/>
+          </a:prstGeom>
+        </p:spPr>
+      </p:pic>
+      <p:pic>
+        <p:nvPicPr>
+          <p:cNvPr id="22" name="Graphique 21" descr="Homme avec un remplissage uni">
+            <a:extLst>
+              <a:ext uri="{FF2B5EF4-FFF2-40B4-BE49-F238E27FC236}">
+                <a16:creationId xmlns:a16="http://schemas.microsoft.com/office/drawing/2014/main" id="{F25F3247-8E16-EE14-1693-0B28427CFCCB}"/>
+              </a:ext>
+            </a:extLst>
+          </p:cNvPr>
+          <p:cNvPicPr>
+            <a:picLocks noChangeAspect="1"/>
+          </p:cNvPicPr>
+          <p:nvPr/>
+        </p:nvPicPr>
+        <p:blipFill>
+          <a:blip r:embed="rId3">
+            <a:extLst>
+              <a:ext uri="{28A0092B-C50C-407E-A947-70E740481C1C}">
+                <a14:useLocalDpi xmlns:a14="http://schemas.microsoft.com/office/drawing/2010/main" val="0"/>
+              </a:ext>
+              <a:ext uri="{96DAC541-7B7A-43D3-8B79-37D633B846F1}">
+                <asvg:svgBlip xmlns:asvg="http://schemas.microsoft.com/office/drawing/2016/SVG/main" r:embed="rId4"/>
+              </a:ext>
+            </a:extLst>
+          </a:blip>
+          <a:stretch>
+            <a:fillRect/>
+          </a:stretch>
+        </p:blipFill>
+        <p:spPr>
+          <a:xfrm>
+            <a:off x="6542640" y="2510643"/>
+            <a:ext cx="1459117" cy="1459117"/>
+          </a:xfrm>
+          <a:prstGeom prst="rect">
+            <a:avLst/>
+          </a:prstGeom>
+        </p:spPr>
+      </p:pic>
+      <p:sp>
+        <p:nvSpPr>
+          <p:cNvPr id="23" name="ZoneTexte 22">
+            <a:extLst>
+              <a:ext uri="{FF2B5EF4-FFF2-40B4-BE49-F238E27FC236}">
+                <a16:creationId xmlns:a16="http://schemas.microsoft.com/office/drawing/2014/main" id="{C186CDF6-AF59-8880-F8B3-AFE096CE3FBB}"/>
+              </a:ext>
+            </a:extLst>
+          </p:cNvPr>
+          <p:cNvSpPr txBox="1"/>
+          <p:nvPr/>
+        </p:nvSpPr>
+        <p:spPr>
+          <a:xfrm>
+            <a:off x="4000121" y="3969760"/>
+            <a:ext cx="1305208" cy="369332"/>
+          </a:xfrm>
+          <a:prstGeom prst="rect">
+            <a:avLst/>
+          </a:prstGeom>
+          <a:noFill/>
+        </p:spPr>
+        <p:txBody>
+          <a:bodyPr wrap="square" rtlCol="0">
+            <a:spAutoFit/>
+          </a:bodyPr>
+          <a:lstStyle/>
+          <a:p>
+            <a:r>
+              <a:rPr lang="fr-FR" dirty="0"/>
+              <a:t>Compte 1</a:t>
+            </a:r>
+            <a:endParaRPr lang="fr-CH" dirty="0"/>
+          </a:p>
+        </p:txBody>
+      </p:sp>
+      <p:sp>
+        <p:nvSpPr>
+          <p:cNvPr id="24" name="ZoneTexte 23">
+            <a:extLst>
+              <a:ext uri="{FF2B5EF4-FFF2-40B4-BE49-F238E27FC236}">
+                <a16:creationId xmlns:a16="http://schemas.microsoft.com/office/drawing/2014/main" id="{3F2E3251-E34F-C186-1779-93A5AE73F3B8}"/>
+              </a:ext>
+            </a:extLst>
+          </p:cNvPr>
+          <p:cNvSpPr txBox="1"/>
+          <p:nvPr/>
+        </p:nvSpPr>
+        <p:spPr>
+          <a:xfrm>
+            <a:off x="6619594" y="3995806"/>
+            <a:ext cx="1305208" cy="369332"/>
+          </a:xfrm>
+          <a:prstGeom prst="rect">
+            <a:avLst/>
+          </a:prstGeom>
+          <a:noFill/>
+        </p:spPr>
+        <p:txBody>
+          <a:bodyPr wrap="square" rtlCol="0">
+            <a:spAutoFit/>
+          </a:bodyPr>
+          <a:lstStyle/>
+          <a:p>
+            <a:r>
+              <a:rPr lang="fr-FR" dirty="0"/>
+              <a:t>Compte 2</a:t>
+            </a:r>
+          </a:p>
+        </p:txBody>
+      </p:sp>
+      <p:sp>
+        <p:nvSpPr>
+          <p:cNvPr id="25" name="ZoneTexte 24">
+            <a:extLst>
+              <a:ext uri="{FF2B5EF4-FFF2-40B4-BE49-F238E27FC236}">
+                <a16:creationId xmlns:a16="http://schemas.microsoft.com/office/drawing/2014/main" id="{479827B3-DEAB-E044-4697-7B8665098F8B}"/>
+              </a:ext>
+            </a:extLst>
+          </p:cNvPr>
+          <p:cNvSpPr txBox="1"/>
+          <p:nvPr/>
+        </p:nvSpPr>
+        <p:spPr>
+          <a:xfrm>
+            <a:off x="5305329" y="1801135"/>
+            <a:ext cx="1385178" cy="646331"/>
+          </a:xfrm>
+          <a:prstGeom prst="rect">
+            <a:avLst/>
+          </a:prstGeom>
+          <a:noFill/>
+        </p:spPr>
+        <p:txBody>
+          <a:bodyPr wrap="square" rtlCol="0">
+            <a:spAutoFit/>
+          </a:bodyPr>
+          <a:lstStyle/>
+          <a:p>
+            <a:r>
+              <a:rPr lang="fr-FR" dirty="0"/>
+              <a:t>Connexion</a:t>
+            </a:r>
+          </a:p>
+          <a:p>
+            <a:endParaRPr lang="fr-CH" dirty="0"/>
+          </a:p>
+        </p:txBody>
+      </p:sp>
+    </p:spTree>
+    <p:extLst>
+      <p:ext uri="{BB962C8B-B14F-4D97-AF65-F5344CB8AC3E}">
+        <p14:creationId xmlns:p14="http://schemas.microsoft.com/office/powerpoint/2010/main" val="798411286"/>
+      </p:ext>
+    </p:extLst>
+  </p:cSld>
+  <p:clrMapOvr>
+    <a:masterClrMapping/>
+  </p:clrMapOvr>
+</p:sld>
+</file>
+
+<file path=ppt/slides/slide7.xml><?xml version="1.0" encoding="utf-8"?>
+<p:sld xmlns:a="http://schemas.openxmlformats.org/drawingml/2006/main" xmlns:r="http://schemas.openxmlformats.org/officeDocument/2006/relationships" xmlns:p="http://schemas.openxmlformats.org/presentationml/2006/main">
+  <p:cSld>
+    <p:spTree>
+      <p:nvGrpSpPr>
+        <p:cNvPr id="1" name=""/>
+        <p:cNvGrpSpPr/>
+        <p:nvPr/>
+      </p:nvGrpSpPr>
+      <p:grpSpPr>
+        <a:xfrm>
+          <a:off x="0" y="0"/>
+          <a:ext cx="0" cy="0"/>
+          <a:chOff x="0" y="0"/>
+          <a:chExt cx="0" cy="0"/>
+        </a:xfrm>
+      </p:grpSpPr>
+      <p:pic>
+        <p:nvPicPr>
+          <p:cNvPr id="3" name="Image 2">
+            <a:extLst>
+              <a:ext uri="{FF2B5EF4-FFF2-40B4-BE49-F238E27FC236}">
+                <a16:creationId xmlns:a16="http://schemas.microsoft.com/office/drawing/2014/main" id="{057F6A15-6687-EC94-853A-6DAA2C4EBDAE}"/>
+              </a:ext>
+            </a:extLst>
+          </p:cNvPr>
+          <p:cNvPicPr>
+            <a:picLocks noChangeAspect="1"/>
+          </p:cNvPicPr>
+          <p:nvPr/>
+        </p:nvPicPr>
+        <p:blipFill>
+          <a:blip r:embed="rId2"/>
+          <a:stretch>
+            <a:fillRect/>
+          </a:stretch>
+        </p:blipFill>
+        <p:spPr>
+          <a:xfrm>
+            <a:off x="0" y="597158"/>
+            <a:ext cx="12192000" cy="6260841"/>
+          </a:xfrm>
+          <a:prstGeom prst="rect">
+            <a:avLst/>
+          </a:prstGeom>
+        </p:spPr>
+      </p:pic>
+      <p:sp>
+        <p:nvSpPr>
+          <p:cNvPr id="4" name="Rectangle 3">
+            <a:extLst>
+              <a:ext uri="{FF2B5EF4-FFF2-40B4-BE49-F238E27FC236}">
+                <a16:creationId xmlns:a16="http://schemas.microsoft.com/office/drawing/2014/main" id="{671DC950-7CED-0154-51FD-C1606DEC1DCF}"/>
+              </a:ext>
+            </a:extLst>
+          </p:cNvPr>
+          <p:cNvSpPr/>
+          <p:nvPr/>
+        </p:nvSpPr>
+        <p:spPr>
+          <a:xfrm>
+            <a:off x="0" y="0"/>
+            <a:ext cx="12192000" cy="597159"/>
+          </a:xfrm>
+          <a:prstGeom prst="rect">
+            <a:avLst/>
+          </a:prstGeom>
+          <a:solidFill>
+            <a:schemeClr val="tx1">
+              <a:lumMod val="75000"/>
+              <a:lumOff val="25000"/>
+            </a:schemeClr>
+          </a:solidFill>
+          <a:ln>
+            <a:noFill/>
+          </a:ln>
+        </p:spPr>
+        <p:style>
+          <a:lnRef idx="2">
+            <a:schemeClr val="dk1">
+              <a:shade val="15000"/>
+            </a:schemeClr>
+          </a:lnRef>
+          <a:fillRef idx="1">
+            <a:schemeClr val="dk1"/>
+          </a:fillRef>
+          <a:effectRef idx="0">
+            <a:schemeClr val="dk1"/>
+          </a:effectRef>
+          <a:fontRef idx="minor">
+            <a:schemeClr val="lt1"/>
+          </a:fontRef>
+        </p:style>
+        <p:txBody>
+          <a:bodyPr rtlCol="0" anchor="ctr"/>
+          <a:lstStyle/>
+          <a:p>
+            <a:pPr algn="ctr"/>
+            <a:r>
+              <a:rPr lang="fr-FR" dirty="0"/>
+              <a:t>BARRE DE NAVIGATION</a:t>
+            </a:r>
+            <a:endParaRPr lang="fr-CH" dirty="0"/>
+          </a:p>
+        </p:txBody>
+      </p:sp>
+      <p:sp>
+        <p:nvSpPr>
+          <p:cNvPr id="5" name="Rectangle 4">
+            <a:extLst>
+              <a:ext uri="{FF2B5EF4-FFF2-40B4-BE49-F238E27FC236}">
+                <a16:creationId xmlns:a16="http://schemas.microsoft.com/office/drawing/2014/main" id="{6FDA09C2-0222-AE2C-5A5A-74C95405DAAF}"/>
+              </a:ext>
+            </a:extLst>
+          </p:cNvPr>
+          <p:cNvSpPr/>
+          <p:nvPr/>
+        </p:nvSpPr>
+        <p:spPr>
+          <a:xfrm>
+            <a:off x="-1" y="6260842"/>
+            <a:ext cx="12192000" cy="597159"/>
+          </a:xfrm>
+          <a:prstGeom prst="rect">
+            <a:avLst/>
+          </a:prstGeom>
+          <a:solidFill>
+            <a:schemeClr val="tx1">
+              <a:lumMod val="75000"/>
+              <a:lumOff val="25000"/>
+            </a:schemeClr>
+          </a:solidFill>
+          <a:ln>
+            <a:noFill/>
+          </a:ln>
+        </p:spPr>
+        <p:style>
+          <a:lnRef idx="2">
+            <a:schemeClr val="dk1">
+              <a:shade val="15000"/>
+            </a:schemeClr>
+          </a:lnRef>
+          <a:fillRef idx="1">
+            <a:schemeClr val="dk1"/>
+          </a:fillRef>
+          <a:effectRef idx="0">
+            <a:schemeClr val="dk1"/>
+          </a:effectRef>
+          <a:fontRef idx="minor">
+            <a:schemeClr val="lt1"/>
+          </a:fontRef>
+        </p:style>
+        <p:txBody>
+          <a:bodyPr rtlCol="0" anchor="ctr"/>
+          <a:lstStyle/>
+          <a:p>
+            <a:pPr algn="ctr"/>
+            <a:r>
+              <a:rPr lang="fr-FR" dirty="0"/>
+              <a:t>FOOTER</a:t>
+            </a:r>
+          </a:p>
+        </p:txBody>
+      </p:sp>
+      <p:sp>
+        <p:nvSpPr>
+          <p:cNvPr id="6" name="Rectangle : coins arrondis 5">
+            <a:extLst>
+              <a:ext uri="{FF2B5EF4-FFF2-40B4-BE49-F238E27FC236}">
+                <a16:creationId xmlns:a16="http://schemas.microsoft.com/office/drawing/2014/main" id="{2585C42F-90C8-470A-D13C-9674026A2B84}"/>
+              </a:ext>
+            </a:extLst>
+          </p:cNvPr>
+          <p:cNvSpPr/>
+          <p:nvPr/>
+        </p:nvSpPr>
+        <p:spPr>
+          <a:xfrm>
+            <a:off x="3094775" y="1378391"/>
+            <a:ext cx="6002447" cy="4101219"/>
+          </a:xfrm>
+          <a:prstGeom prst="roundRect">
+            <a:avLst/>
+          </a:prstGeom>
+          <a:solidFill>
+            <a:schemeClr val="bg1"/>
+          </a:solidFill>
+        </p:spPr>
+        <p:style>
+          <a:lnRef idx="2">
+            <a:schemeClr val="accent1">
+              <a:shade val="15000"/>
+            </a:schemeClr>
+          </a:lnRef>
+          <a:fillRef idx="1">
+            <a:schemeClr val="accent1"/>
+          </a:fillRef>
+          <a:effectRef idx="0">
+            <a:schemeClr val="accent1"/>
+          </a:effectRef>
+          <a:fontRef idx="minor">
+            <a:schemeClr val="lt1"/>
+          </a:fontRef>
+        </p:style>
+        <p:txBody>
+          <a:bodyPr rtlCol="0" anchor="ctr"/>
+          <a:lstStyle/>
+          <a:p>
+            <a:pPr algn="ctr"/>
+            <a:r>
+              <a:rPr lang="fr-FR" dirty="0">
+                <a:solidFill>
+                  <a:schemeClr val="tx1"/>
+                </a:solidFill>
+              </a:rPr>
+              <a:t>INFOS PERSONNELS</a:t>
+            </a:r>
+            <a:endParaRPr lang="fr-CH" dirty="0">
+              <a:solidFill>
+                <a:schemeClr val="tx1"/>
+              </a:solidFill>
+            </a:endParaRPr>
+          </a:p>
+        </p:txBody>
+      </p:sp>
+    </p:spTree>
+    <p:extLst>
+      <p:ext uri="{BB962C8B-B14F-4D97-AF65-F5344CB8AC3E}">
+        <p14:creationId xmlns:p14="http://schemas.microsoft.com/office/powerpoint/2010/main" val="645121547"/>
+      </p:ext>
+    </p:extLst>
+  </p:cSld>
+  <p:clrMapOvr>
+    <a:masterClrMapping/>
+  </p:clrMapOvr>
+</p:sld>
+</file>
+
+<file path=ppt/slides/slide8.xml><?xml version="1.0" encoding="utf-8"?>
+<p:sld xmlns:a="http://schemas.openxmlformats.org/drawingml/2006/main" xmlns:r="http://schemas.openxmlformats.org/officeDocument/2006/relationships" xmlns:p="http://schemas.openxmlformats.org/presentationml/2006/main">
+  <p:cSld>
+    <p:spTree>
+      <p:nvGrpSpPr>
+        <p:cNvPr id="1" name=""/>
+        <p:cNvGrpSpPr/>
+        <p:nvPr/>
+      </p:nvGrpSpPr>
+      <p:grpSpPr>
+        <a:xfrm>
+          <a:off x="0" y="0"/>
+          <a:ext cx="0" cy="0"/>
+          <a:chOff x="0" y="0"/>
+          <a:chExt cx="0" cy="0"/>
+        </a:xfrm>
+      </p:grpSpPr>
+      <p:pic>
+        <p:nvPicPr>
+          <p:cNvPr id="3" name="Image 2">
+            <a:extLst>
+              <a:ext uri="{FF2B5EF4-FFF2-40B4-BE49-F238E27FC236}">
+                <a16:creationId xmlns:a16="http://schemas.microsoft.com/office/drawing/2014/main" id="{057F6A15-6687-EC94-853A-6DAA2C4EBDAE}"/>
+              </a:ext>
+            </a:extLst>
+          </p:cNvPr>
+          <p:cNvPicPr>
+            <a:picLocks noChangeAspect="1"/>
+          </p:cNvPicPr>
+          <p:nvPr/>
+        </p:nvPicPr>
+        <p:blipFill>
+          <a:blip r:embed="rId2"/>
+          <a:stretch>
+            <a:fillRect/>
+          </a:stretch>
+        </p:blipFill>
+        <p:spPr>
+          <a:xfrm>
+            <a:off x="0" y="597158"/>
+            <a:ext cx="12192000" cy="6260841"/>
+          </a:xfrm>
+          <a:prstGeom prst="rect">
+            <a:avLst/>
+          </a:prstGeom>
+        </p:spPr>
+      </p:pic>
+      <p:sp>
+        <p:nvSpPr>
+          <p:cNvPr id="4" name="Rectangle 3">
+            <a:extLst>
+              <a:ext uri="{FF2B5EF4-FFF2-40B4-BE49-F238E27FC236}">
+                <a16:creationId xmlns:a16="http://schemas.microsoft.com/office/drawing/2014/main" id="{671DC950-7CED-0154-51FD-C1606DEC1DCF}"/>
+              </a:ext>
+            </a:extLst>
+          </p:cNvPr>
+          <p:cNvSpPr/>
+          <p:nvPr/>
+        </p:nvSpPr>
+        <p:spPr>
+          <a:xfrm>
+            <a:off x="0" y="0"/>
+            <a:ext cx="12192000" cy="597159"/>
+          </a:xfrm>
+          <a:prstGeom prst="rect">
+            <a:avLst/>
+          </a:prstGeom>
+          <a:solidFill>
+            <a:schemeClr val="tx1">
+              <a:lumMod val="75000"/>
+              <a:lumOff val="25000"/>
+            </a:schemeClr>
+          </a:solidFill>
+          <a:ln>
+            <a:noFill/>
+          </a:ln>
+        </p:spPr>
+        <p:style>
+          <a:lnRef idx="2">
+            <a:schemeClr val="dk1">
+              <a:shade val="15000"/>
+            </a:schemeClr>
+          </a:lnRef>
+          <a:fillRef idx="1">
+            <a:schemeClr val="dk1"/>
+          </a:fillRef>
+          <a:effectRef idx="0">
+            <a:schemeClr val="dk1"/>
+          </a:effectRef>
+          <a:fontRef idx="minor">
+            <a:schemeClr val="lt1"/>
+          </a:fontRef>
+        </p:style>
+        <p:txBody>
+          <a:bodyPr rtlCol="0" anchor="ctr"/>
+          <a:lstStyle/>
+          <a:p>
+            <a:pPr algn="ctr"/>
+            <a:r>
+              <a:rPr lang="fr-FR" dirty="0"/>
+              <a:t>BARRE DE NAVIGATION</a:t>
+            </a:r>
+            <a:endParaRPr lang="fr-CH" dirty="0"/>
+          </a:p>
+        </p:txBody>
+      </p:sp>
+      <p:sp>
+        <p:nvSpPr>
+          <p:cNvPr id="5" name="Rectangle 4">
+            <a:extLst>
+              <a:ext uri="{FF2B5EF4-FFF2-40B4-BE49-F238E27FC236}">
+                <a16:creationId xmlns:a16="http://schemas.microsoft.com/office/drawing/2014/main" id="{6FDA09C2-0222-AE2C-5A5A-74C95405DAAF}"/>
+              </a:ext>
+            </a:extLst>
+          </p:cNvPr>
+          <p:cNvSpPr/>
+          <p:nvPr/>
+        </p:nvSpPr>
+        <p:spPr>
+          <a:xfrm>
+            <a:off x="-1" y="6260842"/>
+            <a:ext cx="12192000" cy="597159"/>
+          </a:xfrm>
+          <a:prstGeom prst="rect">
+            <a:avLst/>
+          </a:prstGeom>
+          <a:solidFill>
+            <a:schemeClr val="tx1">
+              <a:lumMod val="75000"/>
+              <a:lumOff val="25000"/>
+            </a:schemeClr>
+          </a:solidFill>
+          <a:ln>
+            <a:noFill/>
+          </a:ln>
+        </p:spPr>
+        <p:style>
+          <a:lnRef idx="2">
+            <a:schemeClr val="dk1">
+              <a:shade val="15000"/>
+            </a:schemeClr>
+          </a:lnRef>
+          <a:fillRef idx="1">
+            <a:schemeClr val="dk1"/>
+          </a:fillRef>
+          <a:effectRef idx="0">
+            <a:schemeClr val="dk1"/>
+          </a:effectRef>
+          <a:fontRef idx="minor">
+            <a:schemeClr val="lt1"/>
+          </a:fontRef>
+        </p:style>
+        <p:txBody>
+          <a:bodyPr rtlCol="0" anchor="ctr"/>
+          <a:lstStyle/>
+          <a:p>
+            <a:pPr algn="ctr"/>
+            <a:r>
+              <a:rPr lang="fr-FR" dirty="0"/>
+              <a:t>FOOTER</a:t>
+            </a:r>
+          </a:p>
+        </p:txBody>
+      </p:sp>
+      <p:sp>
+        <p:nvSpPr>
+          <p:cNvPr id="6" name="Rectangle : coins arrondis 5">
+            <a:extLst>
+              <a:ext uri="{FF2B5EF4-FFF2-40B4-BE49-F238E27FC236}">
+                <a16:creationId xmlns:a16="http://schemas.microsoft.com/office/drawing/2014/main" id="{2585C42F-90C8-470A-D13C-9674026A2B84}"/>
+              </a:ext>
+            </a:extLst>
+          </p:cNvPr>
+          <p:cNvSpPr/>
+          <p:nvPr/>
+        </p:nvSpPr>
+        <p:spPr>
+          <a:xfrm>
+            <a:off x="3094775" y="1378391"/>
+            <a:ext cx="6002447" cy="4101219"/>
+          </a:xfrm>
+          <a:prstGeom prst="roundRect">
+            <a:avLst/>
+          </a:prstGeom>
+          <a:solidFill>
+            <a:schemeClr val="bg1"/>
+          </a:solidFill>
+        </p:spPr>
+        <p:style>
+          <a:lnRef idx="2">
+            <a:schemeClr val="accent1">
+              <a:shade val="15000"/>
+            </a:schemeClr>
+          </a:lnRef>
+          <a:fillRef idx="1">
+            <a:schemeClr val="accent1"/>
+          </a:fillRef>
+          <a:effectRef idx="0">
+            <a:schemeClr val="accent1"/>
+          </a:effectRef>
+          <a:fontRef idx="minor">
+            <a:schemeClr val="lt1"/>
+          </a:fontRef>
+        </p:style>
+        <p:txBody>
+          <a:bodyPr rtlCol="0" anchor="ctr"/>
+          <a:lstStyle/>
+          <a:p>
+            <a:pPr algn="ctr"/>
+            <a:endParaRPr lang="fr-CH" dirty="0">
+              <a:solidFill>
+                <a:schemeClr val="tx1"/>
+              </a:solidFill>
+            </a:endParaRPr>
+          </a:p>
+        </p:txBody>
+      </p:sp>
+      <p:sp>
+        <p:nvSpPr>
+          <p:cNvPr id="7" name="Rectangle 6">
+            <a:extLst>
+              <a:ext uri="{FF2B5EF4-FFF2-40B4-BE49-F238E27FC236}">
+                <a16:creationId xmlns:a16="http://schemas.microsoft.com/office/drawing/2014/main" id="{B4F52125-2EE0-4F22-9403-A190B9F360A7}"/>
+              </a:ext>
+            </a:extLst>
+          </p:cNvPr>
+          <p:cNvSpPr/>
+          <p:nvPr/>
+        </p:nvSpPr>
+        <p:spPr>
+          <a:xfrm>
+            <a:off x="0" y="0"/>
+            <a:ext cx="12192000" cy="597159"/>
+          </a:xfrm>
+          <a:prstGeom prst="rect">
+            <a:avLst/>
+          </a:prstGeom>
+          <a:solidFill>
+            <a:schemeClr val="tx1">
+              <a:lumMod val="75000"/>
+              <a:lumOff val="25000"/>
+            </a:schemeClr>
+          </a:solidFill>
+          <a:ln>
+            <a:noFill/>
+          </a:ln>
+        </p:spPr>
+        <p:style>
+          <a:lnRef idx="2">
+            <a:schemeClr val="dk1">
+              <a:shade val="15000"/>
+            </a:schemeClr>
+          </a:lnRef>
+          <a:fillRef idx="1">
+            <a:schemeClr val="dk1"/>
+          </a:fillRef>
+          <a:effectRef idx="0">
+            <a:schemeClr val="dk1"/>
+          </a:effectRef>
+          <a:fontRef idx="minor">
+            <a:schemeClr val="lt1"/>
+          </a:fontRef>
+        </p:style>
+        <p:txBody>
+          <a:bodyPr rtlCol="0" anchor="ctr"/>
+          <a:lstStyle/>
+          <a:p>
+            <a:pPr algn="ctr"/>
+            <a:endParaRPr lang="fr-CH"/>
+          </a:p>
+        </p:txBody>
+      </p:sp>
+      <p:sp>
+        <p:nvSpPr>
+          <p:cNvPr id="8" name="ZoneTexte 7">
+            <a:extLst>
+              <a:ext uri="{FF2B5EF4-FFF2-40B4-BE49-F238E27FC236}">
+                <a16:creationId xmlns:a16="http://schemas.microsoft.com/office/drawing/2014/main" id="{4CE4C5BB-6353-849E-3FAC-B103B4E94072}"/>
+              </a:ext>
+            </a:extLst>
+          </p:cNvPr>
+          <p:cNvSpPr txBox="1"/>
+          <p:nvPr/>
+        </p:nvSpPr>
+        <p:spPr>
+          <a:xfrm>
+            <a:off x="9268287" y="160079"/>
+            <a:ext cx="692460" cy="276999"/>
+          </a:xfrm>
+          <a:prstGeom prst="rect">
+            <a:avLst/>
+          </a:prstGeom>
+          <a:noFill/>
+        </p:spPr>
+        <p:txBody>
+          <a:bodyPr wrap="square" rtlCol="0">
+            <a:spAutoFit/>
+          </a:bodyPr>
+          <a:lstStyle/>
+          <a:p>
+            <a:r>
+              <a:rPr lang="fr-CH" sz="1200" dirty="0" err="1">
+                <a:solidFill>
+                  <a:schemeClr val="bg1"/>
+                </a:solidFill>
+              </a:rPr>
+              <a:t>Acceuil</a:t>
+            </a:r>
+            <a:endParaRPr lang="fr-CH" sz="1200" dirty="0">
+              <a:solidFill>
+                <a:schemeClr val="bg1"/>
+              </a:solidFill>
+            </a:endParaRPr>
+          </a:p>
+        </p:txBody>
+      </p:sp>
+      <p:sp>
+        <p:nvSpPr>
+          <p:cNvPr id="9" name="ZoneTexte 8">
+            <a:extLst>
+              <a:ext uri="{FF2B5EF4-FFF2-40B4-BE49-F238E27FC236}">
+                <a16:creationId xmlns:a16="http://schemas.microsoft.com/office/drawing/2014/main" id="{23A51A46-A528-2CF3-F756-2C2CAFD486D5}"/>
+              </a:ext>
+            </a:extLst>
+          </p:cNvPr>
+          <p:cNvSpPr txBox="1"/>
+          <p:nvPr/>
+        </p:nvSpPr>
+        <p:spPr>
+          <a:xfrm>
+            <a:off x="10062093" y="160360"/>
+            <a:ext cx="587404" cy="276999"/>
+          </a:xfrm>
+          <a:prstGeom prst="rect">
+            <a:avLst/>
+          </a:prstGeom>
+          <a:noFill/>
+        </p:spPr>
+        <p:txBody>
+          <a:bodyPr wrap="square" rtlCol="0">
+            <a:spAutoFit/>
+          </a:bodyPr>
+          <a:lstStyle/>
+          <a:p>
+            <a:r>
+              <a:rPr lang="fr-CH" sz="1200" dirty="0">
+                <a:solidFill>
+                  <a:schemeClr val="bg1"/>
+                </a:solidFill>
+              </a:rPr>
+              <a:t>Lots</a:t>
+            </a:r>
+          </a:p>
+        </p:txBody>
+      </p:sp>
+      <p:sp>
+        <p:nvSpPr>
+          <p:cNvPr id="10" name="ZoneTexte 9">
+            <a:extLst>
+              <a:ext uri="{FF2B5EF4-FFF2-40B4-BE49-F238E27FC236}">
+                <a16:creationId xmlns:a16="http://schemas.microsoft.com/office/drawing/2014/main" id="{901053F5-18A6-3984-E421-38A2E95BDFB8}"/>
+              </a:ext>
+            </a:extLst>
+          </p:cNvPr>
+          <p:cNvSpPr txBox="1"/>
+          <p:nvPr/>
+        </p:nvSpPr>
+        <p:spPr>
+          <a:xfrm>
+            <a:off x="10621012" y="160079"/>
+            <a:ext cx="797515" cy="276999"/>
+          </a:xfrm>
+          <a:prstGeom prst="rect">
+            <a:avLst/>
+          </a:prstGeom>
+          <a:noFill/>
+        </p:spPr>
+        <p:txBody>
+          <a:bodyPr wrap="square" rtlCol="0">
+            <a:spAutoFit/>
+          </a:bodyPr>
+          <a:lstStyle/>
+          <a:p>
+            <a:r>
+              <a:rPr lang="fr-CH" sz="1200" dirty="0">
+                <a:solidFill>
+                  <a:schemeClr val="bg1"/>
+                </a:solidFill>
+              </a:rPr>
+              <a:t>A</a:t>
+            </a:r>
+            <a:r>
+              <a:rPr lang="fr-CH" sz="1200" dirty="0"/>
+              <a:t> </a:t>
+            </a:r>
+            <a:r>
+              <a:rPr lang="fr-CH" sz="1200" dirty="0">
+                <a:solidFill>
+                  <a:schemeClr val="bg1"/>
+                </a:solidFill>
+              </a:rPr>
+              <a:t>propos</a:t>
+            </a:r>
+          </a:p>
+        </p:txBody>
+      </p:sp>
+      <p:sp>
+        <p:nvSpPr>
+          <p:cNvPr id="11" name="ZoneTexte 10">
+            <a:extLst>
+              <a:ext uri="{FF2B5EF4-FFF2-40B4-BE49-F238E27FC236}">
+                <a16:creationId xmlns:a16="http://schemas.microsoft.com/office/drawing/2014/main" id="{2AA5AA6A-5EC5-710F-DA30-0ADA6AD3D159}"/>
+              </a:ext>
+            </a:extLst>
+          </p:cNvPr>
+          <p:cNvSpPr txBox="1"/>
+          <p:nvPr/>
+        </p:nvSpPr>
+        <p:spPr>
+          <a:xfrm>
+            <a:off x="11447012" y="160079"/>
+            <a:ext cx="692460" cy="276999"/>
+          </a:xfrm>
+          <a:prstGeom prst="rect">
+            <a:avLst/>
+          </a:prstGeom>
+          <a:noFill/>
+        </p:spPr>
+        <p:txBody>
+          <a:bodyPr wrap="square" rtlCol="0">
+            <a:spAutoFit/>
+          </a:bodyPr>
+          <a:lstStyle/>
+          <a:p>
+            <a:r>
+              <a:rPr lang="fr-CH" sz="1200" dirty="0">
+                <a:solidFill>
+                  <a:schemeClr val="bg1"/>
+                </a:solidFill>
+              </a:rPr>
+              <a:t>Login</a:t>
+            </a:r>
+          </a:p>
+        </p:txBody>
+      </p:sp>
+      <p:sp>
+        <p:nvSpPr>
+          <p:cNvPr id="12" name="ZoneTexte 11">
+            <a:extLst>
+              <a:ext uri="{FF2B5EF4-FFF2-40B4-BE49-F238E27FC236}">
+                <a16:creationId xmlns:a16="http://schemas.microsoft.com/office/drawing/2014/main" id="{4717B9AA-8C8B-71AC-E5AF-E1B9EC13F52D}"/>
+              </a:ext>
+            </a:extLst>
+          </p:cNvPr>
+          <p:cNvSpPr txBox="1"/>
+          <p:nvPr/>
+        </p:nvSpPr>
+        <p:spPr>
+          <a:xfrm>
+            <a:off x="169417" y="142605"/>
+            <a:ext cx="1694894" cy="276999"/>
+          </a:xfrm>
+          <a:prstGeom prst="rect">
+            <a:avLst/>
+          </a:prstGeom>
+          <a:noFill/>
+        </p:spPr>
+        <p:txBody>
+          <a:bodyPr wrap="square" rtlCol="0">
+            <a:spAutoFit/>
+          </a:bodyPr>
+          <a:lstStyle/>
+          <a:p>
+            <a:r>
+              <a:rPr lang="fr-CH" sz="1200" dirty="0">
+                <a:solidFill>
+                  <a:schemeClr val="bg1"/>
+                </a:solidFill>
+              </a:rPr>
+              <a:t>(Logo) RIZCARDEAU</a:t>
+            </a:r>
+          </a:p>
+        </p:txBody>
+      </p:sp>
+      <p:sp>
+        <p:nvSpPr>
+          <p:cNvPr id="25" name="ZoneTexte 24">
+            <a:extLst>
+              <a:ext uri="{FF2B5EF4-FFF2-40B4-BE49-F238E27FC236}">
+                <a16:creationId xmlns:a16="http://schemas.microsoft.com/office/drawing/2014/main" id="{479827B3-DEAB-E044-4697-7B8665098F8B}"/>
+              </a:ext>
+            </a:extLst>
+          </p:cNvPr>
+          <p:cNvSpPr txBox="1"/>
+          <p:nvPr/>
+        </p:nvSpPr>
+        <p:spPr>
+          <a:xfrm>
+            <a:off x="5642570" y="1360079"/>
+            <a:ext cx="906856" cy="369332"/>
+          </a:xfrm>
+          <a:prstGeom prst="rect">
+            <a:avLst/>
+          </a:prstGeom>
+          <a:noFill/>
+        </p:spPr>
+        <p:txBody>
+          <a:bodyPr wrap="square" rtlCol="0">
+            <a:spAutoFit/>
+          </a:bodyPr>
+          <a:lstStyle/>
+          <a:p>
+            <a:r>
+              <a:rPr lang="fr-FR" dirty="0"/>
+              <a:t>IMAGE</a:t>
+            </a:r>
+            <a:endParaRPr lang="fr-CH" dirty="0"/>
+          </a:p>
+        </p:txBody>
+      </p:sp>
+      <p:sp>
+        <p:nvSpPr>
+          <p:cNvPr id="2" name="Rectangle : coins arrondis 1">
+            <a:extLst>
+              <a:ext uri="{FF2B5EF4-FFF2-40B4-BE49-F238E27FC236}">
+                <a16:creationId xmlns:a16="http://schemas.microsoft.com/office/drawing/2014/main" id="{F814D3CA-561F-63CC-9E9B-F596BEE9CCDE}"/>
+              </a:ext>
+            </a:extLst>
+          </p:cNvPr>
+          <p:cNvSpPr/>
+          <p:nvPr/>
+        </p:nvSpPr>
+        <p:spPr>
+          <a:xfrm>
+            <a:off x="4188734" y="2175096"/>
+            <a:ext cx="3814528" cy="2203010"/>
+          </a:xfrm>
+          <a:prstGeom prst="roundRect">
+            <a:avLst/>
+          </a:prstGeom>
+          <a:solidFill>
+            <a:schemeClr val="bg1"/>
+          </a:solidFill>
+        </p:spPr>
+        <p:style>
+          <a:lnRef idx="2">
+            <a:schemeClr val="accent1">
+              <a:shade val="15000"/>
+            </a:schemeClr>
+          </a:lnRef>
+          <a:fillRef idx="1">
+            <a:schemeClr val="accent1"/>
+          </a:fillRef>
+          <a:effectRef idx="0">
+            <a:schemeClr val="accent1"/>
+          </a:effectRef>
+          <a:fontRef idx="minor">
+            <a:schemeClr val="lt1"/>
+          </a:fontRef>
+        </p:style>
+        <p:txBody>
+          <a:bodyPr rtlCol="0" anchor="ctr"/>
+          <a:lstStyle/>
+          <a:p>
+            <a:pPr algn="ctr"/>
+            <a:r>
+              <a:rPr lang="fr-FR" dirty="0">
+                <a:solidFill>
+                  <a:schemeClr val="tx1"/>
+                </a:solidFill>
+              </a:rPr>
+              <a:t>INFOS PERSONNELS</a:t>
+            </a:r>
+            <a:endParaRPr lang="fr-CH" dirty="0">
+              <a:solidFill>
+                <a:schemeClr val="tx1"/>
+              </a:solidFill>
+            </a:endParaRPr>
+          </a:p>
+        </p:txBody>
+      </p:sp>
+      <p:sp>
+        <p:nvSpPr>
+          <p:cNvPr id="13" name="Rectangle : coins arrondis 12">
+            <a:extLst>
+              <a:ext uri="{FF2B5EF4-FFF2-40B4-BE49-F238E27FC236}">
+                <a16:creationId xmlns:a16="http://schemas.microsoft.com/office/drawing/2014/main" id="{07D691D2-B282-3A60-F88D-2B51664D5F28}"/>
+              </a:ext>
+            </a:extLst>
+          </p:cNvPr>
+          <p:cNvSpPr/>
+          <p:nvPr/>
+        </p:nvSpPr>
+        <p:spPr>
+          <a:xfrm>
+            <a:off x="5388318" y="4540122"/>
+            <a:ext cx="1628117" cy="457199"/>
+          </a:xfrm>
+          <a:prstGeom prst="roundRect">
+            <a:avLst/>
+          </a:prstGeom>
+          <a:solidFill>
+            <a:srgbClr val="FF0000"/>
+          </a:solidFill>
+        </p:spPr>
+        <p:style>
+          <a:lnRef idx="2">
+            <a:schemeClr val="accent1">
+              <a:shade val="15000"/>
+            </a:schemeClr>
+          </a:lnRef>
+          <a:fillRef idx="1">
+            <a:schemeClr val="accent1"/>
+          </a:fillRef>
+          <a:effectRef idx="0">
+            <a:schemeClr val="accent1"/>
+          </a:effectRef>
+          <a:fontRef idx="minor">
+            <a:schemeClr val="lt1"/>
+          </a:fontRef>
+        </p:style>
+        <p:txBody>
+          <a:bodyPr rtlCol="0" anchor="ctr"/>
+          <a:lstStyle/>
+          <a:p>
+            <a:pPr algn="ctr"/>
+            <a:r>
+              <a:rPr lang="fr-FR" dirty="0">
+                <a:solidFill>
+                  <a:schemeClr val="bg1"/>
+                </a:solidFill>
+              </a:rPr>
+              <a:t>Déconnexion</a:t>
+            </a:r>
+            <a:endParaRPr lang="fr-CH" dirty="0">
+              <a:solidFill>
+                <a:schemeClr val="bg1"/>
+              </a:solidFill>
+            </a:endParaRPr>
+          </a:p>
+        </p:txBody>
+      </p:sp>
+    </p:spTree>
+    <p:extLst>
+      <p:ext uri="{BB962C8B-B14F-4D97-AF65-F5344CB8AC3E}">
+        <p14:creationId xmlns:p14="http://schemas.microsoft.com/office/powerpoint/2010/main" val="1264472540"/>
       </p:ext>
     </p:extLst>
   </p:cSld>

</xml_diff>